<commit_message>
Update Loan Default case study findings.pptx
updated ppt
</commit_message>
<xml_diff>
--- a/case-study-2/Loan Default case study findings.pptx
+++ b/case-study-2/Loan Default case study findings.pptx
@@ -5,7 +5,7 @@
     <p:sldMasterId id="2147483660" r:id="rId1"/>
   </p:sldMasterIdLst>
   <p:notesMasterIdLst>
-    <p:notesMasterId r:id="rId14"/>
+    <p:notesMasterId r:id="rId15"/>
   </p:notesMasterIdLst>
   <p:sldIdLst>
     <p:sldId id="256" r:id="rId2"/>
@@ -15,11 +15,12 @@
     <p:sldId id="285" r:id="rId6"/>
     <p:sldId id="284" r:id="rId7"/>
     <p:sldId id="258" r:id="rId8"/>
-    <p:sldId id="286" r:id="rId9"/>
-    <p:sldId id="259" r:id="rId10"/>
-    <p:sldId id="287" r:id="rId11"/>
-    <p:sldId id="288" r:id="rId12"/>
-    <p:sldId id="270" r:id="rId13"/>
+    <p:sldId id="289" r:id="rId9"/>
+    <p:sldId id="286" r:id="rId10"/>
+    <p:sldId id="259" r:id="rId11"/>
+    <p:sldId id="287" r:id="rId12"/>
+    <p:sldId id="288" r:id="rId13"/>
+    <p:sldId id="270" r:id="rId14"/>
   </p:sldIdLst>
   <p:sldSz cx="12192000" cy="6858000"/>
   <p:notesSz cx="6858000" cy="9144000"/>
@@ -1649,10 +1650,9 @@
         <a:lstStyle/>
         <a:p>
           <a:r>
-            <a:rPr lang="en-US" sz="2000" dirty="0" smtClean="0"/>
+            <a:rPr lang="en-US" sz="2000" dirty="0"/>
             <a:t>Available column</a:t>
           </a:r>
-          <a:endParaRPr lang="en-US" sz="2000" dirty="0"/>
         </a:p>
       </dgm:t>
     </dgm:pt>
@@ -1686,10 +1686,9 @@
         <a:lstStyle/>
         <a:p>
           <a:r>
-            <a:rPr lang="en-US" sz="1600" dirty="0" smtClean="0"/>
+            <a:rPr lang="en-US" sz="1600" dirty="0"/>
             <a:t>Reason</a:t>
           </a:r>
-          <a:endParaRPr lang="en-US" sz="1600" dirty="0"/>
         </a:p>
       </dgm:t>
     </dgm:pt>
@@ -1723,10 +1722,9 @@
         <a:lstStyle/>
         <a:p>
           <a:r>
-            <a:rPr lang="en-US" sz="1400" dirty="0" smtClean="0"/>
+            <a:rPr lang="en-US" sz="1400" dirty="0"/>
             <a:t>DTI Bin</a:t>
           </a:r>
-          <a:endParaRPr lang="en-US" sz="1400" dirty="0"/>
         </a:p>
       </dgm:t>
     </dgm:pt>
@@ -1738,10 +1736,9 @@
         <a:lstStyle/>
         <a:p>
           <a:r>
-            <a:rPr lang="en-US" sz="1800" dirty="0" smtClean="0"/>
+            <a:rPr lang="en-US" sz="1800" dirty="0"/>
             <a:t>Derived Columns</a:t>
           </a:r>
-          <a:endParaRPr lang="en-US" sz="1800" dirty="0"/>
         </a:p>
       </dgm:t>
     </dgm:pt>
@@ -1797,10 +1794,9 @@
         <a:lstStyle/>
         <a:p>
           <a:r>
-            <a:rPr lang="en-US" sz="1400" dirty="0" smtClean="0"/>
+            <a:rPr lang="en-US" sz="1400" dirty="0"/>
             <a:t>DTI</a:t>
           </a:r>
-          <a:endParaRPr lang="en-US" sz="1400" dirty="0"/>
         </a:p>
       </dgm:t>
     </dgm:pt>
@@ -1834,10 +1830,9 @@
         <a:lstStyle/>
         <a:p>
           <a:r>
-            <a:rPr lang="en-US" sz="1200" dirty="0" smtClean="0"/>
+            <a:rPr lang="en-US" sz="1200" dirty="0"/>
             <a:t>To understand patterns by specific categories</a:t>
           </a:r>
-          <a:endParaRPr lang="en-US" sz="1200" dirty="0"/>
         </a:p>
       </dgm:t>
     </dgm:pt>
@@ -1871,10 +1866,9 @@
         <a:lstStyle/>
         <a:p>
           <a:r>
-            <a:rPr lang="en-US" sz="1400" dirty="0" smtClean="0"/>
+            <a:rPr lang="en-US" sz="1400" dirty="0"/>
             <a:t>Revolving Utilization</a:t>
           </a:r>
-          <a:endParaRPr lang="en-US" sz="1400" dirty="0"/>
         </a:p>
       </dgm:t>
     </dgm:pt>
@@ -1908,10 +1902,9 @@
         <a:lstStyle/>
         <a:p>
           <a:r>
-            <a:rPr lang="en-US" sz="1400" dirty="0" smtClean="0"/>
+            <a:rPr lang="en-US" sz="1400" dirty="0"/>
             <a:t>Interest rate</a:t>
           </a:r>
-          <a:endParaRPr lang="en-US" sz="1400" dirty="0"/>
         </a:p>
       </dgm:t>
     </dgm:pt>
@@ -1945,10 +1938,9 @@
         <a:lstStyle/>
         <a:p>
           <a:r>
-            <a:rPr lang="en-US" sz="1400" dirty="0" smtClean="0"/>
+            <a:rPr lang="en-US" sz="1400" dirty="0"/>
             <a:t>Revolving Utilization</a:t>
           </a:r>
-          <a:endParaRPr lang="en-US" sz="1400" dirty="0"/>
         </a:p>
       </dgm:t>
     </dgm:pt>
@@ -1982,10 +1974,9 @@
         <a:lstStyle/>
         <a:p>
           <a:r>
-            <a:rPr lang="en-US" sz="1400" dirty="0" smtClean="0"/>
+            <a:rPr lang="en-US" sz="1400" dirty="0"/>
             <a:t>Interest rate</a:t>
           </a:r>
-          <a:endParaRPr lang="en-US" sz="1400" dirty="0"/>
         </a:p>
       </dgm:t>
     </dgm:pt>
@@ -2019,13 +2010,6 @@
         </dgm:presLayoutVars>
       </dgm:prSet>
       <dgm:spPr/>
-      <dgm:t>
-        <a:bodyPr/>
-        <a:lstStyle/>
-        <a:p>
-          <a:endParaRPr lang="en-US"/>
-        </a:p>
-      </dgm:t>
     </dgm:pt>
     <dgm:pt modelId="{8D36B8EE-95BD-42E9-97E4-C76FF1BEC880}" type="pres">
       <dgm:prSet presAssocID="{EF1B1446-69BC-47C4-8514-F150AA28F0EA}" presName="composite" presStyleCnt="0"/>
@@ -2042,13 +2026,6 @@
         </dgm:presLayoutVars>
       </dgm:prSet>
       <dgm:spPr/>
-      <dgm:t>
-        <a:bodyPr/>
-        <a:lstStyle/>
-        <a:p>
-          <a:endParaRPr lang="en-US"/>
-        </a:p>
-      </dgm:t>
     </dgm:pt>
     <dgm:pt modelId="{BBB44E7E-AB3E-4D92-871E-B292ADB76B47}" type="pres">
       <dgm:prSet presAssocID="{7F856221-4F2B-4CA4-B600-9543E5A308DE}" presName="compositeSpace" presStyleCnt="0"/>
@@ -2069,13 +2046,6 @@
         </dgm:presLayoutVars>
       </dgm:prSet>
       <dgm:spPr/>
-      <dgm:t>
-        <a:bodyPr/>
-        <a:lstStyle/>
-        <a:p>
-          <a:endParaRPr lang="en-US"/>
-        </a:p>
-      </dgm:t>
     </dgm:pt>
     <dgm:pt modelId="{EA368C30-64A2-47E9-941D-4C1C0539C4AC}" type="pres">
       <dgm:prSet presAssocID="{C15E0D35-8EE1-43BE-99E2-026621475164}" presName="compositeSpace" presStyleCnt="0"/>
@@ -2096,37 +2066,30 @@
         </dgm:presLayoutVars>
       </dgm:prSet>
       <dgm:spPr/>
-      <dgm:t>
-        <a:bodyPr/>
-        <a:lstStyle/>
-        <a:p>
-          <a:endParaRPr lang="en-US"/>
-        </a:p>
-      </dgm:t>
     </dgm:pt>
   </dgm:ptLst>
   <dgm:cxnLst>
+    <dgm:cxn modelId="{375D9F00-A4E3-4DDB-88BE-A02D0F0266CC}" srcId="{260ED0EC-3CE0-4CED-A9DE-21D7404BDCD0}" destId="{86B8F369-2BAD-44A2-B061-A58F77A3D914}" srcOrd="1" destOrd="0" parTransId="{17AC7101-8587-49E1-8062-06B18423A11C}" sibTransId="{C15E0D35-8EE1-43BE-99E2-026621475164}"/>
     <dgm:cxn modelId="{6B332801-2428-4431-84A6-351E5BB1B875}" type="presOf" srcId="{C22126E4-D9D6-4406-A97E-8721897B7987}" destId="{2038D8A7-44D1-4F6C-96B1-E9C5DB2ECD20}" srcOrd="0" destOrd="1" presId="urn:microsoft.com/office/officeart/2005/8/layout/chevronAccent+Icon"/>
-    <dgm:cxn modelId="{89754CB2-798E-4FF8-91A4-6433A8F09D0E}" type="presOf" srcId="{31E364CA-B981-4057-A779-A996CA2F34B2}" destId="{58A6145A-6296-47E3-BC97-C07C29E364BC}" srcOrd="0" destOrd="2" presId="urn:microsoft.com/office/officeart/2005/8/layout/chevronAccent+Icon"/>
-    <dgm:cxn modelId="{CDA9D7E9-97D4-4E02-9257-FD7463CBF676}" srcId="{86B8F369-2BAD-44A2-B061-A58F77A3D914}" destId="{31E364CA-B981-4057-A779-A996CA2F34B2}" srcOrd="1" destOrd="0" parTransId="{0426EFB4-46D2-40AE-9C56-D1D4B923FDE6}" sibTransId="{A155A401-493D-4ACE-B747-12CE40125C05}"/>
-    <dgm:cxn modelId="{375D9F00-A4E3-4DDB-88BE-A02D0F0266CC}" srcId="{260ED0EC-3CE0-4CED-A9DE-21D7404BDCD0}" destId="{86B8F369-2BAD-44A2-B061-A58F77A3D914}" srcOrd="1" destOrd="0" parTransId="{17AC7101-8587-49E1-8062-06B18423A11C}" sibTransId="{C15E0D35-8EE1-43BE-99E2-026621475164}"/>
-    <dgm:cxn modelId="{FFEBB1A7-4574-4D8F-BDE4-B687D415FB8A}" srcId="{EF1B1446-69BC-47C4-8514-F150AA28F0EA}" destId="{C22126E4-D9D6-4406-A97E-8721897B7987}" srcOrd="0" destOrd="0" parTransId="{15D43299-0801-4844-A658-D850E193BD3D}" sibTransId="{482582C1-E0E5-485A-B66A-91E58EE6C971}"/>
-    <dgm:cxn modelId="{71545CF0-566C-4C30-BEF2-EB1AF8B6747C}" srcId="{86B8F369-2BAD-44A2-B061-A58F77A3D914}" destId="{F30F06E4-DC9C-4F09-ADAB-0A909D4BB14D}" srcOrd="0" destOrd="0" parTransId="{F73A12B3-C849-420B-978A-C2E42D7C7834}" sibTransId="{66928491-A25A-4754-8622-7431AE382D31}"/>
-    <dgm:cxn modelId="{CA5079AA-19BF-40ED-BE5A-F56E59647B37}" srcId="{81D1BB8B-FAA6-4D95-9961-8D6FAA4CE46E}" destId="{FF8DEC90-0BB5-4CC5-B690-76CE4C123E1A}" srcOrd="0" destOrd="0" parTransId="{1F5C6231-86D9-4E19-8845-56D2221D5474}" sibTransId="{F38A8B1D-D1B7-4CB8-8223-9A37A9884A8F}"/>
+    <dgm:cxn modelId="{EA60E505-4B26-4BC5-A132-A1C5A3B167B4}" type="presOf" srcId="{81D1BB8B-FAA6-4D95-9961-8D6FAA4CE46E}" destId="{B107831F-CEBB-41D5-95CB-0396851292DD}" srcOrd="0" destOrd="0" presId="urn:microsoft.com/office/officeart/2005/8/layout/chevronAccent+Icon"/>
+    <dgm:cxn modelId="{3C561A1E-D16C-4848-A12F-509C6BA03CB3}" type="presOf" srcId="{ED1CF0BA-E2DE-4DA7-946A-14214A8680F9}" destId="{58A6145A-6296-47E3-BC97-C07C29E364BC}" srcOrd="0" destOrd="3" presId="urn:microsoft.com/office/officeart/2005/8/layout/chevronAccent+Icon"/>
+    <dgm:cxn modelId="{23315F2E-1438-493A-B0F0-47AFBD37827F}" type="presOf" srcId="{78939EBB-1C96-4E36-B0FE-829E192333B6}" destId="{2038D8A7-44D1-4F6C-96B1-E9C5DB2ECD20}" srcOrd="0" destOrd="3" presId="urn:microsoft.com/office/officeart/2005/8/layout/chevronAccent+Icon"/>
+    <dgm:cxn modelId="{D4C0733D-68A9-4B86-AC7B-AD40D4D60DF6}" srcId="{260ED0EC-3CE0-4CED-A9DE-21D7404BDCD0}" destId="{EF1B1446-69BC-47C4-8514-F150AA28F0EA}" srcOrd="0" destOrd="0" parTransId="{7C22C5F4-35E8-4AD7-8731-9D394C041A22}" sibTransId="{7F856221-4F2B-4CA4-B600-9543E5A308DE}"/>
+    <dgm:cxn modelId="{F8929C62-CF7A-466B-9A8C-05B721052F36}" srcId="{86B8F369-2BAD-44A2-B061-A58F77A3D914}" destId="{ED1CF0BA-E2DE-4DA7-946A-14214A8680F9}" srcOrd="2" destOrd="0" parTransId="{8CA5FFB9-6664-4FA8-813A-395D0BC99AA5}" sibTransId="{80BE054C-6C31-48B2-A46A-7273F69CC5A5}"/>
     <dgm:cxn modelId="{F60B8966-7C8C-4407-A0C3-6E3925D16A82}" type="presOf" srcId="{F30F06E4-DC9C-4F09-ADAB-0A909D4BB14D}" destId="{58A6145A-6296-47E3-BC97-C07C29E364BC}" srcOrd="0" destOrd="1" presId="urn:microsoft.com/office/officeart/2005/8/layout/chevronAccent+Icon"/>
-    <dgm:cxn modelId="{3C561A1E-D16C-4848-A12F-509C6BA03CB3}" type="presOf" srcId="{ED1CF0BA-E2DE-4DA7-946A-14214A8680F9}" destId="{58A6145A-6296-47E3-BC97-C07C29E364BC}" srcOrd="0" destOrd="3" presId="urn:microsoft.com/office/officeart/2005/8/layout/chevronAccent+Icon"/>
     <dgm:cxn modelId="{7B2A5F76-A6DB-4AB4-BAE4-A6976238A83F}" type="presOf" srcId="{EF1B1446-69BC-47C4-8514-F150AA28F0EA}" destId="{2038D8A7-44D1-4F6C-96B1-E9C5DB2ECD20}" srcOrd="0" destOrd="0" presId="urn:microsoft.com/office/officeart/2005/8/layout/chevronAccent+Icon"/>
     <dgm:cxn modelId="{6C1CF68E-7E78-40D5-8D7E-F72754F60CEF}" type="presOf" srcId="{4A9D639A-18EB-43A3-9E6C-966481711B33}" destId="{2038D8A7-44D1-4F6C-96B1-E9C5DB2ECD20}" srcOrd="0" destOrd="2" presId="urn:microsoft.com/office/officeart/2005/8/layout/chevronAccent+Icon"/>
-    <dgm:cxn modelId="{F8929C62-CF7A-466B-9A8C-05B721052F36}" srcId="{86B8F369-2BAD-44A2-B061-A58F77A3D914}" destId="{ED1CF0BA-E2DE-4DA7-946A-14214A8680F9}" srcOrd="2" destOrd="0" parTransId="{8CA5FFB9-6664-4FA8-813A-395D0BC99AA5}" sibTransId="{80BE054C-6C31-48B2-A46A-7273F69CC5A5}"/>
-    <dgm:cxn modelId="{D4C0733D-68A9-4B86-AC7B-AD40D4D60DF6}" srcId="{260ED0EC-3CE0-4CED-A9DE-21D7404BDCD0}" destId="{EF1B1446-69BC-47C4-8514-F150AA28F0EA}" srcOrd="0" destOrd="0" parTransId="{7C22C5F4-35E8-4AD7-8731-9D394C041A22}" sibTransId="{7F856221-4F2B-4CA4-B600-9543E5A308DE}"/>
-    <dgm:cxn modelId="{CC1B06E5-17F1-4AB9-A456-5A0AE6E4F5FE}" type="presOf" srcId="{260ED0EC-3CE0-4CED-A9DE-21D7404BDCD0}" destId="{7D301E9D-EBE8-4637-A01D-BB538FC5E50B}" srcOrd="0" destOrd="0" presId="urn:microsoft.com/office/officeart/2005/8/layout/chevronAccent+Icon"/>
+    <dgm:cxn modelId="{854D128F-8789-413A-A294-715FABDD1119}" srcId="{EF1B1446-69BC-47C4-8514-F150AA28F0EA}" destId="{4A9D639A-18EB-43A3-9E6C-966481711B33}" srcOrd="1" destOrd="0" parTransId="{7F968EA3-C2C9-47DF-945E-1A6F1E259885}" sibTransId="{F9550CE1-1AE7-485B-BC91-02771481EFF6}"/>
+    <dgm:cxn modelId="{24D3B892-5992-45F1-9BF6-7EC3C08C4476}" type="presOf" srcId="{86B8F369-2BAD-44A2-B061-A58F77A3D914}" destId="{58A6145A-6296-47E3-BC97-C07C29E364BC}" srcOrd="0" destOrd="0" presId="urn:microsoft.com/office/officeart/2005/8/layout/chevronAccent+Icon"/>
+    <dgm:cxn modelId="{FFEBB1A7-4574-4D8F-BDE4-B687D415FB8A}" srcId="{EF1B1446-69BC-47C4-8514-F150AA28F0EA}" destId="{C22126E4-D9D6-4406-A97E-8721897B7987}" srcOrd="0" destOrd="0" parTransId="{15D43299-0801-4844-A658-D850E193BD3D}" sibTransId="{482582C1-E0E5-485A-B66A-91E58EE6C971}"/>
+    <dgm:cxn modelId="{CA5079AA-19BF-40ED-BE5A-F56E59647B37}" srcId="{81D1BB8B-FAA6-4D95-9961-8D6FAA4CE46E}" destId="{FF8DEC90-0BB5-4CC5-B690-76CE4C123E1A}" srcOrd="0" destOrd="0" parTransId="{1F5C6231-86D9-4E19-8845-56D2221D5474}" sibTransId="{F38A8B1D-D1B7-4CB8-8223-9A37A9884A8F}"/>
     <dgm:cxn modelId="{940607AB-4675-4257-9C0D-80C7D67DAB18}" srcId="{260ED0EC-3CE0-4CED-A9DE-21D7404BDCD0}" destId="{81D1BB8B-FAA6-4D95-9961-8D6FAA4CE46E}" srcOrd="2" destOrd="0" parTransId="{370B0C6A-D786-4B69-B009-B7650CAD43ED}" sibTransId="{41B71C27-8B5C-40A4-8634-7AC27047E0E4}"/>
-    <dgm:cxn modelId="{23315F2E-1438-493A-B0F0-47AFBD37827F}" type="presOf" srcId="{78939EBB-1C96-4E36-B0FE-829E192333B6}" destId="{2038D8A7-44D1-4F6C-96B1-E9C5DB2ECD20}" srcOrd="0" destOrd="3" presId="urn:microsoft.com/office/officeart/2005/8/layout/chevronAccent+Icon"/>
-    <dgm:cxn modelId="{24D3B892-5992-45F1-9BF6-7EC3C08C4476}" type="presOf" srcId="{86B8F369-2BAD-44A2-B061-A58F77A3D914}" destId="{58A6145A-6296-47E3-BC97-C07C29E364BC}" srcOrd="0" destOrd="0" presId="urn:microsoft.com/office/officeart/2005/8/layout/chevronAccent+Icon"/>
-    <dgm:cxn modelId="{EA60E505-4B26-4BC5-A132-A1C5A3B167B4}" type="presOf" srcId="{81D1BB8B-FAA6-4D95-9961-8D6FAA4CE46E}" destId="{B107831F-CEBB-41D5-95CB-0396851292DD}" srcOrd="0" destOrd="0" presId="urn:microsoft.com/office/officeart/2005/8/layout/chevronAccent+Icon"/>
-    <dgm:cxn modelId="{854D128F-8789-413A-A294-715FABDD1119}" srcId="{EF1B1446-69BC-47C4-8514-F150AA28F0EA}" destId="{4A9D639A-18EB-43A3-9E6C-966481711B33}" srcOrd="1" destOrd="0" parTransId="{7F968EA3-C2C9-47DF-945E-1A6F1E259885}" sibTransId="{F9550CE1-1AE7-485B-BC91-02771481EFF6}"/>
+    <dgm:cxn modelId="{89754CB2-798E-4FF8-91A4-6433A8F09D0E}" type="presOf" srcId="{31E364CA-B981-4057-A779-A996CA2F34B2}" destId="{58A6145A-6296-47E3-BC97-C07C29E364BC}" srcOrd="0" destOrd="2" presId="urn:microsoft.com/office/officeart/2005/8/layout/chevronAccent+Icon"/>
     <dgm:cxn modelId="{407E0AC5-EA5E-4C56-8632-700DD14F3FC2}" srcId="{EF1B1446-69BC-47C4-8514-F150AA28F0EA}" destId="{78939EBB-1C96-4E36-B0FE-829E192333B6}" srcOrd="2" destOrd="0" parTransId="{3FD27A03-F7A2-431E-97D5-04010645A050}" sibTransId="{B2D72634-189B-483C-965D-2E37C9A85657}"/>
     <dgm:cxn modelId="{E2F960E4-743C-4ECB-B80A-F721AFE7E072}" type="presOf" srcId="{FF8DEC90-0BB5-4CC5-B690-76CE4C123E1A}" destId="{B107831F-CEBB-41D5-95CB-0396851292DD}" srcOrd="0" destOrd="1" presId="urn:microsoft.com/office/officeart/2005/8/layout/chevronAccent+Icon"/>
+    <dgm:cxn modelId="{CC1B06E5-17F1-4AB9-A456-5A0AE6E4F5FE}" type="presOf" srcId="{260ED0EC-3CE0-4CED-A9DE-21D7404BDCD0}" destId="{7D301E9D-EBE8-4637-A01D-BB538FC5E50B}" srcOrd="0" destOrd="0" presId="urn:microsoft.com/office/officeart/2005/8/layout/chevronAccent+Icon"/>
+    <dgm:cxn modelId="{CDA9D7E9-97D4-4E02-9257-FD7463CBF676}" srcId="{86B8F369-2BAD-44A2-B061-A58F77A3D914}" destId="{31E364CA-B981-4057-A779-A996CA2F34B2}" srcOrd="1" destOrd="0" parTransId="{0426EFB4-46D2-40AE-9C56-D1D4B923FDE6}" sibTransId="{A155A401-493D-4ACE-B747-12CE40125C05}"/>
+    <dgm:cxn modelId="{71545CF0-566C-4C30-BEF2-EB1AF8B6747C}" srcId="{86B8F369-2BAD-44A2-B061-A58F77A3D914}" destId="{F30F06E4-DC9C-4F09-ADAB-0A909D4BB14D}" srcOrd="0" destOrd="0" parTransId="{F73A12B3-C849-420B-978A-C2E42D7C7834}" sibTransId="{66928491-A25A-4754-8622-7431AE382D31}"/>
     <dgm:cxn modelId="{0E023CB3-98AE-4B85-9551-431FA1AD5DA3}" type="presParOf" srcId="{7D301E9D-EBE8-4637-A01D-BB538FC5E50B}" destId="{8D36B8EE-95BD-42E9-97E4-C76FF1BEC880}" srcOrd="0" destOrd="0" presId="urn:microsoft.com/office/officeart/2005/8/layout/chevronAccent+Icon"/>
     <dgm:cxn modelId="{C74D6C2B-9426-4A43-8A6F-8D7A324726A4}" type="presParOf" srcId="{8D36B8EE-95BD-42E9-97E4-C76FF1BEC880}" destId="{3B66FC59-1B17-4256-BC4A-69EBCA3E6787}" srcOrd="0" destOrd="0" presId="urn:microsoft.com/office/officeart/2005/8/layout/chevronAccent+Icon"/>
     <dgm:cxn modelId="{7AE9414F-E5CB-4CBA-BC6F-6EA12785ECB4}" type="presParOf" srcId="{8D36B8EE-95BD-42E9-97E4-C76FF1BEC880}" destId="{2038D8A7-44D1-4F6C-96B1-E9C5DB2ECD20}" srcOrd="1" destOrd="0" presId="urn:microsoft.com/office/officeart/2005/8/layout/chevronAccent+Icon"/>
@@ -2143,7 +2106,7 @@
   <dgm:whole/>
   <dgm:extLst>
     <a:ext uri="http://schemas.microsoft.com/office/drawing/2008/diagram">
-      <dsp:dataModelExt xmlns:dsp="http://schemas.microsoft.com/office/drawing/2008/diagram" relId="rId6" minVer="http://schemas.openxmlformats.org/drawingml/2006/diagram"/>
+      <dsp:dataModelExt xmlns:dsp="http://schemas.microsoft.com/office/drawing/2008/diagram" relId="rId7" minVer="http://schemas.openxmlformats.org/drawingml/2006/diagram"/>
     </a:ext>
   </dgm:extLst>
 </dgm:dataModel>
@@ -2179,10 +2142,9 @@
         <a:p>
           <a:pPr algn="l"/>
           <a:r>
-            <a:rPr lang="en-US" dirty="0" smtClean="0"/>
+            <a:rPr lang="en-US" dirty="0"/>
             <a:t>Idle time and Trip duration are higher in the morning due to peak hours and lack of flights</a:t>
           </a:r>
-          <a:endParaRPr lang="en-US" dirty="0"/>
         </a:p>
       </dgm:t>
     </dgm:pt>
@@ -2223,10 +2185,9 @@
         <a:p>
           <a:pPr algn="l"/>
           <a:r>
-            <a:rPr lang="en-US" dirty="0" smtClean="0"/>
+            <a:rPr lang="en-US" dirty="0"/>
             <a:t>Higher cancellations</a:t>
           </a:r>
-          <a:endParaRPr lang="en-US" dirty="0"/>
         </a:p>
       </dgm:t>
     </dgm:pt>
@@ -2268,10 +2229,9 @@
         <a:p>
           <a:pPr algn="l"/>
           <a:r>
-            <a:rPr lang="en-US" dirty="0" smtClean="0"/>
+            <a:rPr lang="en-US" dirty="0"/>
             <a:t>Evening, Night and late night cars availability at airport is an issue because drivers are moving towards city</a:t>
           </a:r>
-          <a:endParaRPr lang="en-US" dirty="0"/>
         </a:p>
       </dgm:t>
     </dgm:pt>
@@ -2312,10 +2272,9 @@
         <a:p>
           <a:pPr algn="l"/>
           <a:r>
-            <a:rPr lang="en-US" dirty="0" smtClean="0"/>
+            <a:rPr lang="en-US" dirty="0"/>
             <a:t>Huge supply demand gap at airports</a:t>
           </a:r>
-          <a:endParaRPr lang="en-US" dirty="0"/>
         </a:p>
       </dgm:t>
     </dgm:pt>
@@ -2356,25 +2315,24 @@
         <a:p>
           <a:pPr algn="ctr"/>
           <a:r>
-            <a:rPr lang="en-US" sz="1600" b="1" u="sng" dirty="0" smtClean="0"/>
+            <a:rPr lang="en-US" sz="1600" b="1" u="sng" dirty="0"/>
             <a:t>Recommendations</a:t>
           </a:r>
-          <a:endParaRPr lang="en-US" sz="1500" b="1" u="sng" dirty="0" smtClean="0"/>
+          <a:endParaRPr lang="en-US" sz="1500" b="1" u="sng" dirty="0"/>
         </a:p>
         <a:p>
           <a:pPr algn="l"/>
           <a:r>
-            <a:rPr lang="en-US" sz="1500" dirty="0" smtClean="0"/>
+            <a:rPr lang="en-US" sz="1500" dirty="0"/>
             <a:t>1) Idle time needs to be solved by incentivizing the drivers who wait at airport</a:t>
           </a:r>
         </a:p>
         <a:p>
           <a:pPr algn="l"/>
           <a:r>
-            <a:rPr lang="en-US" sz="1500" dirty="0" smtClean="0"/>
+            <a:rPr lang="en-US" sz="1500" dirty="0"/>
             <a:t>2) Dedicate airport cabs with bit premium rates could be made available from airport during Evening, night and late night hours</a:t>
           </a:r>
-          <a:endParaRPr lang="en-US" sz="1500" dirty="0"/>
         </a:p>
       </dgm:t>
     </dgm:pt>
@@ -2408,13 +2366,6 @@
         </dgm:presLayoutVars>
       </dgm:prSet>
       <dgm:spPr/>
-      <dgm:t>
-        <a:bodyPr/>
-        <a:lstStyle/>
-        <a:p>
-          <a:endParaRPr lang="en-US"/>
-        </a:p>
-      </dgm:t>
     </dgm:pt>
     <dgm:pt modelId="{5754AB50-5138-46A7-BC39-0EBB17175FDF}" type="pres">
       <dgm:prSet presAssocID="{174B8CC8-94C2-40B2-8B16-226A635FDB2E}" presName="node" presStyleLbl="node1" presStyleIdx="0" presStyleCnt="5">
@@ -2423,13 +2374,6 @@
         </dgm:presLayoutVars>
       </dgm:prSet>
       <dgm:spPr/>
-      <dgm:t>
-        <a:bodyPr/>
-        <a:lstStyle/>
-        <a:p>
-          <a:endParaRPr lang="en-US"/>
-        </a:p>
-      </dgm:t>
     </dgm:pt>
     <dgm:pt modelId="{91FAAA92-CFFD-4A17-9BDE-C2F2F93833D8}" type="pres">
       <dgm:prSet presAssocID="{AD8CC473-C8FB-40CF-AE2F-4DC96737587F}" presName="sibTrans" presStyleCnt="0"/>
@@ -2442,13 +2386,6 @@
         </dgm:presLayoutVars>
       </dgm:prSet>
       <dgm:spPr/>
-      <dgm:t>
-        <a:bodyPr/>
-        <a:lstStyle/>
-        <a:p>
-          <a:endParaRPr lang="en-US"/>
-        </a:p>
-      </dgm:t>
     </dgm:pt>
     <dgm:pt modelId="{ABAA7878-B847-4D4B-95D1-267AACAF39B3}" type="pres">
       <dgm:prSet presAssocID="{5AB5BABC-897C-450F-9521-43B086FCB8AC}" presName="sibTrans" presStyleCnt="0"/>
@@ -2461,13 +2398,6 @@
         </dgm:presLayoutVars>
       </dgm:prSet>
       <dgm:spPr/>
-      <dgm:t>
-        <a:bodyPr/>
-        <a:lstStyle/>
-        <a:p>
-          <a:endParaRPr lang="en-US"/>
-        </a:p>
-      </dgm:t>
     </dgm:pt>
     <dgm:pt modelId="{792753AE-53A2-4D03-B393-8599116D964A}" type="pres">
       <dgm:prSet presAssocID="{EAE8AC85-36E8-4A1A-9D8A-DED9FEF958B7}" presName="sibTrans" presStyleCnt="0"/>
@@ -2480,13 +2410,6 @@
         </dgm:presLayoutVars>
       </dgm:prSet>
       <dgm:spPr/>
-      <dgm:t>
-        <a:bodyPr/>
-        <a:lstStyle/>
-        <a:p>
-          <a:endParaRPr lang="en-US"/>
-        </a:p>
-      </dgm:t>
     </dgm:pt>
     <dgm:pt modelId="{8D739B1B-1B2D-41F5-868E-32BB1D1D212A}" type="pres">
       <dgm:prSet presAssocID="{A54F562E-A39F-44A7-AB3E-F5142D8E4C86}" presName="sibTrans" presStyleCnt="0"/>
@@ -2499,27 +2422,20 @@
         </dgm:presLayoutVars>
       </dgm:prSet>
       <dgm:spPr/>
-      <dgm:t>
-        <a:bodyPr/>
-        <a:lstStyle/>
-        <a:p>
-          <a:endParaRPr lang="en-US"/>
-        </a:p>
-      </dgm:t>
     </dgm:pt>
   </dgm:ptLst>
   <dgm:cxnLst>
+    <dgm:cxn modelId="{69FF5B19-2C17-49C7-818B-06F4E8CCB19F}" srcId="{DC041154-F0B5-4CBD-A6DD-E0EFB8D014E4}" destId="{79299D3B-EE87-40C6-830C-068B540B7E07}" srcOrd="1" destOrd="0" parTransId="{8080858D-49E0-4698-B567-0FAB52965F9A}" sibTransId="{5AB5BABC-897C-450F-9521-43B086FCB8AC}"/>
+    <dgm:cxn modelId="{FEFC195D-7D82-4279-91D7-F2EE6263D475}" srcId="{DC041154-F0B5-4CBD-A6DD-E0EFB8D014E4}" destId="{8A48A12A-C404-4020-824E-D49F89E14C71}" srcOrd="4" destOrd="0" parTransId="{58EE057A-5814-47FB-A983-1A71B5DF6146}" sibTransId="{88FC3478-113E-4C59-853B-80F01AF6397E}"/>
+    <dgm:cxn modelId="{9B390E42-FB9A-45DC-9BDB-0570FB572F73}" type="presOf" srcId="{DC041154-F0B5-4CBD-A6DD-E0EFB8D014E4}" destId="{0B13829F-2664-40EA-9E51-82B319FC310B}" srcOrd="0" destOrd="0" presId="urn:microsoft.com/office/officeart/2005/8/layout/default"/>
+    <dgm:cxn modelId="{A572336C-6DF6-40D8-AF93-030A5E337995}" type="presOf" srcId="{665B8820-E5D6-4421-A892-5BC573708853}" destId="{13E42E5F-4EB9-4DD4-A050-E1CF14CA3B85}" srcOrd="0" destOrd="0" presId="urn:microsoft.com/office/officeart/2005/8/layout/default"/>
+    <dgm:cxn modelId="{ABC3AC4C-66DF-4464-9ADE-9E9894D91A0A}" type="presOf" srcId="{8A48A12A-C404-4020-824E-D49F89E14C71}" destId="{44D47586-5AE1-4FC3-B194-168E1BD7FB2A}" srcOrd="0" destOrd="0" presId="urn:microsoft.com/office/officeart/2005/8/layout/default"/>
+    <dgm:cxn modelId="{A349FC8A-7633-444E-8E30-28600BE81252}" srcId="{DC041154-F0B5-4CBD-A6DD-E0EFB8D014E4}" destId="{665B8820-E5D6-4421-A892-5BC573708853}" srcOrd="3" destOrd="0" parTransId="{2DB81970-C5DD-4AE2-86EC-33039910C0CB}" sibTransId="{A54F562E-A39F-44A7-AB3E-F5142D8E4C86}"/>
+    <dgm:cxn modelId="{FA9D9C92-8C52-46C0-A11A-FD19B1084A86}" type="presOf" srcId="{174B8CC8-94C2-40B2-8B16-226A635FDB2E}" destId="{5754AB50-5138-46A7-BC39-0EBB17175FDF}" srcOrd="0" destOrd="0" presId="urn:microsoft.com/office/officeart/2005/8/layout/default"/>
+    <dgm:cxn modelId="{0A235294-CA4D-491B-9C48-B95E4967D986}" type="presOf" srcId="{6571444D-1E06-44E8-ABF4-5EC377577174}" destId="{A5AABAE6-CC5D-4404-92AE-8BE2E3E60A76}" srcOrd="0" destOrd="0" presId="urn:microsoft.com/office/officeart/2005/8/layout/default"/>
     <dgm:cxn modelId="{F69D03B9-A598-4C25-A351-2197B1D12AC0}" srcId="{DC041154-F0B5-4CBD-A6DD-E0EFB8D014E4}" destId="{174B8CC8-94C2-40B2-8B16-226A635FDB2E}" srcOrd="0" destOrd="0" parTransId="{6D17835A-FE69-4A43-94A1-A0BAAA172FC5}" sibTransId="{AD8CC473-C8FB-40CF-AE2F-4DC96737587F}"/>
-    <dgm:cxn modelId="{0A235294-CA4D-491B-9C48-B95E4967D986}" type="presOf" srcId="{6571444D-1E06-44E8-ABF4-5EC377577174}" destId="{A5AABAE6-CC5D-4404-92AE-8BE2E3E60A76}" srcOrd="0" destOrd="0" presId="urn:microsoft.com/office/officeart/2005/8/layout/default"/>
-    <dgm:cxn modelId="{A572336C-6DF6-40D8-AF93-030A5E337995}" type="presOf" srcId="{665B8820-E5D6-4421-A892-5BC573708853}" destId="{13E42E5F-4EB9-4DD4-A050-E1CF14CA3B85}" srcOrd="0" destOrd="0" presId="urn:microsoft.com/office/officeart/2005/8/layout/default"/>
+    <dgm:cxn modelId="{8F1622E0-5B5E-4AD2-85FB-518D064A8F42}" type="presOf" srcId="{79299D3B-EE87-40C6-830C-068B540B7E07}" destId="{7D36522F-69F4-4621-8D51-D2DC07DBF2E6}" srcOrd="0" destOrd="0" presId="urn:microsoft.com/office/officeart/2005/8/layout/default"/>
     <dgm:cxn modelId="{6EA343EB-4CD3-49DA-8205-50744B566761}" srcId="{DC041154-F0B5-4CBD-A6DD-E0EFB8D014E4}" destId="{6571444D-1E06-44E8-ABF4-5EC377577174}" srcOrd="2" destOrd="0" parTransId="{F3B846BD-3D51-4CC2-B0D9-F5ADB274E2A0}" sibTransId="{EAE8AC85-36E8-4A1A-9D8A-DED9FEF958B7}"/>
-    <dgm:cxn modelId="{8F1622E0-5B5E-4AD2-85FB-518D064A8F42}" type="presOf" srcId="{79299D3B-EE87-40C6-830C-068B540B7E07}" destId="{7D36522F-69F4-4621-8D51-D2DC07DBF2E6}" srcOrd="0" destOrd="0" presId="urn:microsoft.com/office/officeart/2005/8/layout/default"/>
-    <dgm:cxn modelId="{ABC3AC4C-66DF-4464-9ADE-9E9894D91A0A}" type="presOf" srcId="{8A48A12A-C404-4020-824E-D49F89E14C71}" destId="{44D47586-5AE1-4FC3-B194-168E1BD7FB2A}" srcOrd="0" destOrd="0" presId="urn:microsoft.com/office/officeart/2005/8/layout/default"/>
-    <dgm:cxn modelId="{FEFC195D-7D82-4279-91D7-F2EE6263D475}" srcId="{DC041154-F0B5-4CBD-A6DD-E0EFB8D014E4}" destId="{8A48A12A-C404-4020-824E-D49F89E14C71}" srcOrd="4" destOrd="0" parTransId="{58EE057A-5814-47FB-A983-1A71B5DF6146}" sibTransId="{88FC3478-113E-4C59-853B-80F01AF6397E}"/>
-    <dgm:cxn modelId="{FA9D9C92-8C52-46C0-A11A-FD19B1084A86}" type="presOf" srcId="{174B8CC8-94C2-40B2-8B16-226A635FDB2E}" destId="{5754AB50-5138-46A7-BC39-0EBB17175FDF}" srcOrd="0" destOrd="0" presId="urn:microsoft.com/office/officeart/2005/8/layout/default"/>
-    <dgm:cxn modelId="{9B390E42-FB9A-45DC-9BDB-0570FB572F73}" type="presOf" srcId="{DC041154-F0B5-4CBD-A6DD-E0EFB8D014E4}" destId="{0B13829F-2664-40EA-9E51-82B319FC310B}" srcOrd="0" destOrd="0" presId="urn:microsoft.com/office/officeart/2005/8/layout/default"/>
-    <dgm:cxn modelId="{69FF5B19-2C17-49C7-818B-06F4E8CCB19F}" srcId="{DC041154-F0B5-4CBD-A6DD-E0EFB8D014E4}" destId="{79299D3B-EE87-40C6-830C-068B540B7E07}" srcOrd="1" destOrd="0" parTransId="{8080858D-49E0-4698-B567-0FAB52965F9A}" sibTransId="{5AB5BABC-897C-450F-9521-43B086FCB8AC}"/>
-    <dgm:cxn modelId="{A349FC8A-7633-444E-8E30-28600BE81252}" srcId="{DC041154-F0B5-4CBD-A6DD-E0EFB8D014E4}" destId="{665B8820-E5D6-4421-A892-5BC573708853}" srcOrd="3" destOrd="0" parTransId="{2DB81970-C5DD-4AE2-86EC-33039910C0CB}" sibTransId="{A54F562E-A39F-44A7-AB3E-F5142D8E4C86}"/>
     <dgm:cxn modelId="{8278575B-B113-4B1E-9796-C9CB89F4726F}" type="presParOf" srcId="{0B13829F-2664-40EA-9E51-82B319FC310B}" destId="{5754AB50-5138-46A7-BC39-0EBB17175FDF}" srcOrd="0" destOrd="0" presId="urn:microsoft.com/office/officeart/2005/8/layout/default"/>
     <dgm:cxn modelId="{4D2CDA41-E2ED-47C6-ABD6-8A6C43EAD703}" type="presParOf" srcId="{0B13829F-2664-40EA-9E51-82B319FC310B}" destId="{91FAAA92-CFFD-4A17-9BDE-C2F2F93833D8}" srcOrd="1" destOrd="0" presId="urn:microsoft.com/office/officeart/2005/8/layout/default"/>
     <dgm:cxn modelId="{50A24BAF-7751-4C1D-ABEF-5B5685EFA2DD}" type="presParOf" srcId="{0B13829F-2664-40EA-9E51-82B319FC310B}" destId="{7D36522F-69F4-4621-8D51-D2DC07DBF2E6}" srcOrd="2" destOrd="0" presId="urn:microsoft.com/office/officeart/2005/8/layout/default"/>
@@ -2656,7 +2572,7 @@
         </a:bodyPr>
         <a:lstStyle/>
         <a:p>
-          <a:pPr lvl="0" algn="l" defTabSz="889000">
+          <a:pPr marL="0" lvl="0" indent="0" algn="l" defTabSz="889000">
             <a:lnSpc>
               <a:spcPct val="90000"/>
             </a:lnSpc>
@@ -2666,12 +2582,12 @@
             <a:spcAft>
               <a:spcPct val="35000"/>
             </a:spcAft>
+            <a:buNone/>
           </a:pPr>
           <a:r>
-            <a:rPr lang="en-US" sz="2000" kern="1200" dirty="0" smtClean="0"/>
+            <a:rPr lang="en-US" sz="2000" kern="1200" dirty="0"/>
             <a:t>Available column</a:t>
           </a:r>
-          <a:endParaRPr lang="en-US" sz="2000" kern="1200" dirty="0"/>
         </a:p>
         <a:p>
           <a:pPr marL="114300" lvl="1" indent="-114300" algn="l" defTabSz="622300">
@@ -2684,13 +2600,12 @@
             <a:spcAft>
               <a:spcPct val="15000"/>
             </a:spcAft>
-            <a:buChar char="••"/>
+            <a:buChar char="•"/>
           </a:pPr>
           <a:r>
-            <a:rPr lang="en-US" sz="1400" kern="1200" dirty="0" smtClean="0"/>
+            <a:rPr lang="en-US" sz="1400" kern="1200" dirty="0"/>
             <a:t>DTI</a:t>
           </a:r>
-          <a:endParaRPr lang="en-US" sz="1400" kern="1200" dirty="0"/>
         </a:p>
         <a:p>
           <a:pPr marL="114300" lvl="1" indent="-114300" algn="l" defTabSz="622300">
@@ -2703,13 +2618,12 @@
             <a:spcAft>
               <a:spcPct val="15000"/>
             </a:spcAft>
-            <a:buChar char="••"/>
+            <a:buChar char="•"/>
           </a:pPr>
           <a:r>
-            <a:rPr lang="en-US" sz="1400" kern="1200" dirty="0" smtClean="0"/>
+            <a:rPr lang="en-US" sz="1400" kern="1200" dirty="0"/>
             <a:t>Revolving Utilization</a:t>
           </a:r>
-          <a:endParaRPr lang="en-US" sz="1400" kern="1200" dirty="0"/>
         </a:p>
         <a:p>
           <a:pPr marL="114300" lvl="1" indent="-114300" algn="l" defTabSz="622300">
@@ -2722,13 +2636,12 @@
             <a:spcAft>
               <a:spcPct val="15000"/>
             </a:spcAft>
-            <a:buChar char="••"/>
+            <a:buChar char="•"/>
           </a:pPr>
           <a:r>
-            <a:rPr lang="en-US" sz="1400" kern="1200" dirty="0" smtClean="0"/>
+            <a:rPr lang="en-US" sz="1400" kern="1200" dirty="0"/>
             <a:t>Interest rate</a:t>
           </a:r>
-          <a:endParaRPr lang="en-US" sz="1400" kern="1200" dirty="0"/>
         </a:p>
       </dsp:txBody>
       <dsp:txXfrm>
@@ -2844,7 +2757,7 @@
         </a:bodyPr>
         <a:lstStyle/>
         <a:p>
-          <a:pPr lvl="0" algn="l" defTabSz="800100">
+          <a:pPr marL="0" lvl="0" indent="0" algn="l" defTabSz="800100">
             <a:lnSpc>
               <a:spcPct val="90000"/>
             </a:lnSpc>
@@ -2854,12 +2767,12 @@
             <a:spcAft>
               <a:spcPct val="35000"/>
             </a:spcAft>
+            <a:buNone/>
           </a:pPr>
           <a:r>
-            <a:rPr lang="en-US" sz="1800" kern="1200" dirty="0" smtClean="0"/>
+            <a:rPr lang="en-US" sz="1800" kern="1200" dirty="0"/>
             <a:t>Derived Columns</a:t>
           </a:r>
-          <a:endParaRPr lang="en-US" sz="1800" kern="1200" dirty="0"/>
         </a:p>
         <a:p>
           <a:pPr marL="114300" lvl="1" indent="-114300" algn="l" defTabSz="622300">
@@ -2872,13 +2785,12 @@
             <a:spcAft>
               <a:spcPct val="15000"/>
             </a:spcAft>
-            <a:buChar char="••"/>
+            <a:buChar char="•"/>
           </a:pPr>
           <a:r>
-            <a:rPr lang="en-US" sz="1400" kern="1200" dirty="0" smtClean="0"/>
+            <a:rPr lang="en-US" sz="1400" kern="1200" dirty="0"/>
             <a:t>DTI Bin</a:t>
           </a:r>
-          <a:endParaRPr lang="en-US" sz="1400" kern="1200" dirty="0"/>
         </a:p>
         <a:p>
           <a:pPr marL="114300" lvl="1" indent="-114300" algn="l" defTabSz="622300">
@@ -2891,13 +2803,12 @@
             <a:spcAft>
               <a:spcPct val="15000"/>
             </a:spcAft>
-            <a:buChar char="••"/>
+            <a:buChar char="•"/>
           </a:pPr>
           <a:r>
-            <a:rPr lang="en-US" sz="1400" kern="1200" dirty="0" smtClean="0"/>
+            <a:rPr lang="en-US" sz="1400" kern="1200" dirty="0"/>
             <a:t>Revolving Utilization</a:t>
           </a:r>
-          <a:endParaRPr lang="en-US" sz="1400" kern="1200" dirty="0"/>
         </a:p>
         <a:p>
           <a:pPr marL="114300" lvl="1" indent="-114300" algn="l" defTabSz="622300">
@@ -2910,13 +2821,12 @@
             <a:spcAft>
               <a:spcPct val="15000"/>
             </a:spcAft>
-            <a:buChar char="••"/>
+            <a:buChar char="•"/>
           </a:pPr>
           <a:r>
-            <a:rPr lang="en-US" sz="1400" kern="1200" dirty="0" smtClean="0"/>
+            <a:rPr lang="en-US" sz="1400" kern="1200" dirty="0"/>
             <a:t>Interest rate</a:t>
           </a:r>
-          <a:endParaRPr lang="en-US" sz="1400" kern="1200" dirty="0"/>
         </a:p>
       </dsp:txBody>
       <dsp:txXfrm>
@@ -3032,7 +2942,7 @@
         </a:bodyPr>
         <a:lstStyle/>
         <a:p>
-          <a:pPr lvl="0" algn="l" defTabSz="711200">
+          <a:pPr marL="0" lvl="0" indent="0" algn="l" defTabSz="711200">
             <a:lnSpc>
               <a:spcPct val="90000"/>
             </a:lnSpc>
@@ -3042,12 +2952,12 @@
             <a:spcAft>
               <a:spcPct val="35000"/>
             </a:spcAft>
+            <a:buNone/>
           </a:pPr>
           <a:r>
-            <a:rPr lang="en-US" sz="1600" kern="1200" dirty="0" smtClean="0"/>
+            <a:rPr lang="en-US" sz="1600" kern="1200" dirty="0"/>
             <a:t>Reason</a:t>
           </a:r>
-          <a:endParaRPr lang="en-US" sz="1600" kern="1200" dirty="0"/>
         </a:p>
         <a:p>
           <a:pPr marL="114300" lvl="1" indent="-114300" algn="l" defTabSz="533400">
@@ -3060,13 +2970,12 @@
             <a:spcAft>
               <a:spcPct val="15000"/>
             </a:spcAft>
-            <a:buChar char="••"/>
+            <a:buChar char="•"/>
           </a:pPr>
           <a:r>
-            <a:rPr lang="en-US" sz="1200" kern="1200" dirty="0" smtClean="0"/>
+            <a:rPr lang="en-US" sz="1200" kern="1200" dirty="0"/>
             <a:t>To understand patterns by specific categories</a:t>
           </a:r>
-          <a:endParaRPr lang="en-US" sz="1200" kern="1200" dirty="0"/>
         </a:p>
       </dsp:txBody>
       <dsp:txXfrm>
@@ -3139,7 +3048,7 @@
         </a:bodyPr>
         <a:lstStyle/>
         <a:p>
-          <a:pPr lvl="0" algn="l" defTabSz="1066800">
+          <a:pPr marL="0" lvl="0" indent="0" algn="l" defTabSz="1066800">
             <a:lnSpc>
               <a:spcPct val="90000"/>
             </a:lnSpc>
@@ -3149,12 +3058,12 @@
             <a:spcAft>
               <a:spcPct val="35000"/>
             </a:spcAft>
+            <a:buNone/>
           </a:pPr>
           <a:r>
-            <a:rPr lang="en-US" sz="2400" kern="1200" dirty="0" smtClean="0"/>
+            <a:rPr lang="en-US" sz="2400" kern="1200" dirty="0"/>
             <a:t>Idle time and Trip duration are higher in the morning due to peak hours and lack of flights</a:t>
           </a:r>
-          <a:endParaRPr lang="en-US" sz="2400" kern="1200" dirty="0"/>
         </a:p>
       </dsp:txBody>
       <dsp:txXfrm>
@@ -3214,7 +3123,7 @@
         </a:bodyPr>
         <a:lstStyle/>
         <a:p>
-          <a:pPr lvl="0" algn="l" defTabSz="1066800">
+          <a:pPr marL="0" lvl="0" indent="0" algn="l" defTabSz="1066800">
             <a:lnSpc>
               <a:spcPct val="90000"/>
             </a:lnSpc>
@@ -3224,12 +3133,12 @@
             <a:spcAft>
               <a:spcPct val="35000"/>
             </a:spcAft>
+            <a:buNone/>
           </a:pPr>
           <a:r>
-            <a:rPr lang="en-US" sz="2400" kern="1200" dirty="0" smtClean="0"/>
+            <a:rPr lang="en-US" sz="2400" kern="1200" dirty="0"/>
             <a:t>Higher cancellations</a:t>
           </a:r>
-          <a:endParaRPr lang="en-US" sz="2400" kern="1200" dirty="0"/>
         </a:p>
       </dsp:txBody>
       <dsp:txXfrm>
@@ -3290,7 +3199,7 @@
         </a:bodyPr>
         <a:lstStyle/>
         <a:p>
-          <a:pPr lvl="0" algn="l" defTabSz="1066800">
+          <a:pPr marL="0" lvl="0" indent="0" algn="l" defTabSz="1066800">
             <a:lnSpc>
               <a:spcPct val="90000"/>
             </a:lnSpc>
@@ -3300,12 +3209,12 @@
             <a:spcAft>
               <a:spcPct val="35000"/>
             </a:spcAft>
+            <a:buNone/>
           </a:pPr>
           <a:r>
-            <a:rPr lang="en-US" sz="2400" kern="1200" dirty="0" smtClean="0"/>
+            <a:rPr lang="en-US" sz="2400" kern="1200" dirty="0"/>
             <a:t>Evening, Night and late night cars availability at airport is an issue because drivers are moving towards city</a:t>
           </a:r>
-          <a:endParaRPr lang="en-US" sz="2400" kern="1200" dirty="0"/>
         </a:p>
       </dsp:txBody>
       <dsp:txXfrm>
@@ -3365,7 +3274,7 @@
         </a:bodyPr>
         <a:lstStyle/>
         <a:p>
-          <a:pPr lvl="0" algn="l" defTabSz="1066800">
+          <a:pPr marL="0" lvl="0" indent="0" algn="l" defTabSz="1066800">
             <a:lnSpc>
               <a:spcPct val="90000"/>
             </a:lnSpc>
@@ -3375,12 +3284,12 @@
             <a:spcAft>
               <a:spcPct val="35000"/>
             </a:spcAft>
+            <a:buNone/>
           </a:pPr>
           <a:r>
-            <a:rPr lang="en-US" sz="2400" kern="1200" dirty="0" smtClean="0"/>
+            <a:rPr lang="en-US" sz="2400" kern="1200" dirty="0"/>
             <a:t>Huge supply demand gap at airports</a:t>
           </a:r>
-          <a:endParaRPr lang="en-US" sz="2400" kern="1200" dirty="0"/>
         </a:p>
       </dsp:txBody>
       <dsp:txXfrm>
@@ -3440,7 +3349,7 @@
         </a:bodyPr>
         <a:lstStyle/>
         <a:p>
-          <a:pPr lvl="0" algn="ctr" defTabSz="711200">
+          <a:pPr marL="0" lvl="0" indent="0" algn="ctr" defTabSz="711200">
             <a:lnSpc>
               <a:spcPct val="90000"/>
             </a:lnSpc>
@@ -3450,15 +3359,16 @@
             <a:spcAft>
               <a:spcPct val="35000"/>
             </a:spcAft>
+            <a:buNone/>
           </a:pPr>
           <a:r>
-            <a:rPr lang="en-US" sz="1600" b="1" u="sng" kern="1200" dirty="0" smtClean="0"/>
+            <a:rPr lang="en-US" sz="1600" b="1" u="sng" kern="1200" dirty="0"/>
             <a:t>Recommendations</a:t>
           </a:r>
-          <a:endParaRPr lang="en-US" sz="1500" b="1" u="sng" kern="1200" dirty="0" smtClean="0"/>
+          <a:endParaRPr lang="en-US" sz="1500" b="1" u="sng" kern="1200" dirty="0"/>
         </a:p>
         <a:p>
-          <a:pPr lvl="0" algn="l" defTabSz="711200">
+          <a:pPr marL="0" lvl="0" indent="0" algn="l" defTabSz="711200">
             <a:lnSpc>
               <a:spcPct val="90000"/>
             </a:lnSpc>
@@ -3468,14 +3378,15 @@
             <a:spcAft>
               <a:spcPct val="35000"/>
             </a:spcAft>
+            <a:buNone/>
           </a:pPr>
           <a:r>
-            <a:rPr lang="en-US" sz="1500" kern="1200" dirty="0" smtClean="0"/>
+            <a:rPr lang="en-US" sz="1500" kern="1200" dirty="0"/>
             <a:t>1) Idle time needs to be solved by incentivizing the drivers who wait at airport</a:t>
           </a:r>
         </a:p>
         <a:p>
-          <a:pPr lvl="0" algn="l" defTabSz="711200">
+          <a:pPr marL="0" lvl="0" indent="0" algn="l" defTabSz="711200">
             <a:lnSpc>
               <a:spcPct val="90000"/>
             </a:lnSpc>
@@ -3485,12 +3396,12 @@
             <a:spcAft>
               <a:spcPct val="35000"/>
             </a:spcAft>
+            <a:buNone/>
           </a:pPr>
           <a:r>
-            <a:rPr lang="en-US" sz="1500" kern="1200" dirty="0" smtClean="0"/>
+            <a:rPr lang="en-US" sz="1500" kern="1200" dirty="0"/>
             <a:t>2) Dedicate airport cabs with bit premium rates could be made available from airport during Evening, night and late night hours</a:t>
           </a:r>
-          <a:endParaRPr lang="en-US" sz="1500" kern="1200" dirty="0"/>
         </a:p>
       </dsp:txBody>
       <dsp:txXfrm>
@@ -6226,6 +6137,203 @@
     </a:lvl9pPr>
   </p:notesStyle>
 </p:notesMaster>
+</file>
+
+<file path=ppt/notesSlides/notesSlide1.xml><?xml version="1.0" encoding="utf-8"?>
+<p:notes xmlns:a="http://schemas.openxmlformats.org/drawingml/2006/main" xmlns:r="http://schemas.openxmlformats.org/officeDocument/2006/relationships" xmlns:p="http://schemas.openxmlformats.org/presentationml/2006/main">
+  <p:cSld>
+    <p:spTree>
+      <p:nvGrpSpPr>
+        <p:cNvPr id="1" name=""/>
+        <p:cNvGrpSpPr/>
+        <p:nvPr/>
+      </p:nvGrpSpPr>
+      <p:grpSpPr>
+        <a:xfrm>
+          <a:off x="0" y="0"/>
+          <a:ext cx="0" cy="0"/>
+          <a:chOff x="0" y="0"/>
+          <a:chExt cx="0" cy="0"/>
+        </a:xfrm>
+      </p:grpSpPr>
+      <p:sp>
+        <p:nvSpPr>
+          <p:cNvPr id="2" name="Slide Image Placeholder 1"/>
+          <p:cNvSpPr>
+            <a:spLocks noGrp="1" noRot="1" noChangeAspect="1"/>
+          </p:cNvSpPr>
+          <p:nvPr>
+            <p:ph type="sldImg"/>
+          </p:nvPr>
+        </p:nvSpPr>
+        <p:spPr/>
+      </p:sp>
+      <p:sp>
+        <p:nvSpPr>
+          <p:cNvPr id="3" name="Notes Placeholder 2"/>
+          <p:cNvSpPr>
+            <a:spLocks noGrp="1"/>
+          </p:cNvSpPr>
+          <p:nvPr>
+            <p:ph type="body" idx="1"/>
+          </p:nvPr>
+        </p:nvSpPr>
+        <p:spPr/>
+        <p:txBody>
+          <a:bodyPr/>
+          <a:lstStyle/>
+          <a:p>
+            <a:r>
+              <a:rPr lang="en-US" dirty="0"/>
+              <a:t>Additional derived columns</a:t>
+            </a:r>
+          </a:p>
+          <a:p>
+            <a:pPr marL="228600" indent="-228600">
+              <a:buAutoNum type="arabicPeriod"/>
+            </a:pPr>
+            <a:r>
+              <a:rPr lang="en-US" dirty="0" err="1"/>
+              <a:t>loan_default</a:t>
+            </a:r>
+            <a:endParaRPr lang="en-US" dirty="0"/>
+          </a:p>
+          <a:p>
+            <a:pPr marL="228600" indent="-228600">
+              <a:buAutoNum type="arabicPeriod"/>
+            </a:pPr>
+            <a:r>
+              <a:rPr lang="en-US" dirty="0" err="1"/>
+              <a:t>annual_inc</a:t>
+            </a:r>
+            <a:r>
+              <a:rPr lang="en-US" dirty="0"/>
+              <a:t> </a:t>
+            </a:r>
+          </a:p>
+        </p:txBody>
+      </p:sp>
+      <p:sp>
+        <p:nvSpPr>
+          <p:cNvPr id="4" name="Slide Number Placeholder 3"/>
+          <p:cNvSpPr>
+            <a:spLocks noGrp="1"/>
+          </p:cNvSpPr>
+          <p:nvPr>
+            <p:ph type="sldNum" sz="quarter" idx="5"/>
+          </p:nvPr>
+        </p:nvSpPr>
+        <p:spPr/>
+        <p:txBody>
+          <a:bodyPr/>
+          <a:lstStyle/>
+          <a:p>
+            <a:fld id="{5354517F-9C19-4E9A-AB98-AA89BD9F1D1D}" type="slidenum">
+              <a:rPr lang="en-IN" smtClean="0"/>
+              <a:t>6</a:t>
+            </a:fld>
+            <a:endParaRPr lang="en-IN"/>
+          </a:p>
+        </p:txBody>
+      </p:sp>
+    </p:spTree>
+    <p:extLst>
+      <p:ext uri="{BB962C8B-B14F-4D97-AF65-F5344CB8AC3E}">
+        <p14:creationId xmlns:p14="http://schemas.microsoft.com/office/powerpoint/2010/main" val="1989229739"/>
+      </p:ext>
+    </p:extLst>
+  </p:cSld>
+  <p:clrMapOvr>
+    <a:masterClrMapping/>
+  </p:clrMapOvr>
+</p:notes>
+</file>
+
+<file path=ppt/notesSlides/notesSlide2.xml><?xml version="1.0" encoding="utf-8"?>
+<p:notes xmlns:a="http://schemas.openxmlformats.org/drawingml/2006/main" xmlns:r="http://schemas.openxmlformats.org/officeDocument/2006/relationships" xmlns:p="http://schemas.openxmlformats.org/presentationml/2006/main">
+  <p:cSld>
+    <p:spTree>
+      <p:nvGrpSpPr>
+        <p:cNvPr id="1" name=""/>
+        <p:cNvGrpSpPr/>
+        <p:nvPr/>
+      </p:nvGrpSpPr>
+      <p:grpSpPr>
+        <a:xfrm>
+          <a:off x="0" y="0"/>
+          <a:ext cx="0" cy="0"/>
+          <a:chOff x="0" y="0"/>
+          <a:chExt cx="0" cy="0"/>
+        </a:xfrm>
+      </p:grpSpPr>
+      <p:sp>
+        <p:nvSpPr>
+          <p:cNvPr id="2" name="Slide Image Placeholder 1"/>
+          <p:cNvSpPr>
+            <a:spLocks noGrp="1" noRot="1" noChangeAspect="1"/>
+          </p:cNvSpPr>
+          <p:nvPr>
+            <p:ph type="sldImg"/>
+          </p:nvPr>
+        </p:nvSpPr>
+        <p:spPr/>
+      </p:sp>
+      <p:sp>
+        <p:nvSpPr>
+          <p:cNvPr id="3" name="Notes Placeholder 2"/>
+          <p:cNvSpPr>
+            <a:spLocks noGrp="1"/>
+          </p:cNvSpPr>
+          <p:nvPr>
+            <p:ph type="body" idx="1"/>
+          </p:nvPr>
+        </p:nvSpPr>
+        <p:spPr/>
+        <p:txBody>
+          <a:bodyPr/>
+          <a:lstStyle/>
+          <a:p>
+            <a:r>
+              <a:rPr lang="en-US" dirty="0"/>
+              <a:t>Change the title</a:t>
+            </a:r>
+          </a:p>
+        </p:txBody>
+      </p:sp>
+      <p:sp>
+        <p:nvSpPr>
+          <p:cNvPr id="4" name="Slide Number Placeholder 3"/>
+          <p:cNvSpPr>
+            <a:spLocks noGrp="1"/>
+          </p:cNvSpPr>
+          <p:nvPr>
+            <p:ph type="sldNum" sz="quarter" idx="5"/>
+          </p:nvPr>
+        </p:nvSpPr>
+        <p:spPr/>
+        <p:txBody>
+          <a:bodyPr/>
+          <a:lstStyle/>
+          <a:p>
+            <a:fld id="{5354517F-9C19-4E9A-AB98-AA89BD9F1D1D}" type="slidenum">
+              <a:rPr lang="en-IN" smtClean="0"/>
+              <a:t>12</a:t>
+            </a:fld>
+            <a:endParaRPr lang="en-IN"/>
+          </a:p>
+        </p:txBody>
+      </p:sp>
+    </p:spTree>
+    <p:extLst>
+      <p:ext uri="{BB962C8B-B14F-4D97-AF65-F5344CB8AC3E}">
+        <p14:creationId xmlns:p14="http://schemas.microsoft.com/office/powerpoint/2010/main" val="4045554462"/>
+      </p:ext>
+    </p:extLst>
+  </p:cSld>
+  <p:clrMapOvr>
+    <a:masterClrMapping/>
+  </p:clrMapOvr>
+</p:notes>
 </file>
 
 <file path=ppt/slideLayouts/slideLayout1.xml><?xml version="1.0" encoding="utf-8"?>
@@ -9210,29 +9318,24 @@
           <a:lstStyle/>
           <a:p>
             <a:r>
-              <a:rPr lang="en-IN" sz="2800" dirty="0" smtClean="0"/>
+              <a:rPr lang="en-IN" sz="2800" dirty="0"/>
               <a:t>Loan Default </a:t>
             </a:r>
             <a:r>
-              <a:rPr lang="en-IN" sz="2800" dirty="0" err="1" smtClean="0"/>
+              <a:rPr lang="en-IN" sz="2800" dirty="0" err="1"/>
               <a:t>Gramener</a:t>
             </a:r>
             <a:r>
-              <a:rPr lang="en-IN" sz="2800" dirty="0" smtClean="0"/>
+              <a:rPr lang="en-IN" sz="2800" dirty="0"/>
               <a:t> Case Study</a:t>
             </a:r>
-            <a:r>
-              <a:rPr lang="en-IN" sz="2800" dirty="0" smtClean="0"/>
-              <a:t/>
-            </a:r>
             <a:br>
-              <a:rPr lang="en-IN" sz="2800" dirty="0" smtClean="0"/>
+              <a:rPr lang="en-IN" sz="2800" dirty="0"/>
             </a:br>
             <a:r>
-              <a:rPr lang="en-IN" sz="2800" dirty="0" smtClean="0"/>
+              <a:rPr lang="en-IN" sz="2800" dirty="0"/>
               <a:t> </a:t>
             </a:r>
-            <a:endParaRPr lang="en-IN" sz="2800" dirty="0"/>
           </a:p>
         </p:txBody>
       </p:sp>
@@ -9257,7 +9360,7 @@
           <a:lstStyle/>
           <a:p>
             <a:r>
-              <a:rPr lang="en-IN" dirty="0" smtClean="0"/>
+              <a:rPr lang="en-IN" dirty="0"/>
               <a:t>SUBMISSION</a:t>
             </a:r>
             <a:endParaRPr lang="en-US" dirty="0"/>
@@ -9452,7 +9555,7 @@
           <a:p>
             <a:pPr algn="l"/>
             <a:r>
-              <a:rPr lang="en-IN" sz="1600" b="1" dirty="0" smtClean="0"/>
+              <a:rPr lang="en-IN" sz="1600" b="1" dirty="0"/>
               <a:t>Team</a:t>
             </a:r>
           </a:p>
@@ -9462,14 +9565,14 @@
               <a:buChar char="•"/>
             </a:pPr>
             <a:r>
-              <a:rPr lang="en-IN" sz="1400" dirty="0" smtClean="0"/>
+              <a:rPr lang="en-IN" sz="1400" dirty="0"/>
               <a:t>Krishnan R</a:t>
             </a:r>
             <a:r>
-              <a:rPr lang="en-US" sz="1400" dirty="0" err="1" smtClean="0"/>
-              <a:t>aghupati</a:t>
+              <a:rPr lang="en-US" sz="1400" dirty="0" err="1"/>
+              <a:t>aghupathi</a:t>
             </a:r>
-            <a:endParaRPr lang="en-US" sz="1400" dirty="0" smtClean="0"/>
+            <a:endParaRPr lang="en-US" sz="1400" dirty="0"/>
           </a:p>
           <a:p>
             <a:pPr marL="285750" indent="-285750" algn="l">
@@ -9477,11 +9580,11 @@
               <a:buChar char="•"/>
             </a:pPr>
             <a:r>
-              <a:rPr lang="en-US" sz="1400" dirty="0" err="1" smtClean="0"/>
-              <a:t>Nandita</a:t>
+              <a:rPr lang="en-US" sz="1400" dirty="0" err="1"/>
+              <a:t>Nanditha</a:t>
             </a:r>
             <a:r>
-              <a:rPr lang="en-US" sz="1400" dirty="0" smtClean="0"/>
+              <a:rPr lang="en-US" sz="1400" dirty="0"/>
               <a:t> GN</a:t>
             </a:r>
           </a:p>
@@ -9491,18 +9594,18 @@
               <a:buChar char="•"/>
             </a:pPr>
             <a:r>
-              <a:rPr lang="en-US" sz="1400" dirty="0" err="1" smtClean="0"/>
+              <a:rPr lang="en-US" sz="1400" dirty="0" err="1"/>
               <a:t>Srividya</a:t>
             </a:r>
             <a:r>
-              <a:rPr lang="en-US" sz="1400" dirty="0" smtClean="0"/>
+              <a:rPr lang="en-US" sz="1400" dirty="0"/>
               <a:t> </a:t>
             </a:r>
             <a:r>
-              <a:rPr lang="en-US" sz="1400" dirty="0" err="1" smtClean="0"/>
+              <a:rPr lang="en-US" sz="1400" dirty="0" err="1"/>
               <a:t>Ravichandran</a:t>
             </a:r>
-            <a:endParaRPr lang="en-US" sz="1400" dirty="0" smtClean="0"/>
+            <a:endParaRPr lang="en-US" sz="1400" dirty="0"/>
           </a:p>
           <a:p>
             <a:pPr marL="285750" indent="-285750" algn="l">
@@ -9510,10 +9613,10 @@
               <a:buChar char="•"/>
             </a:pPr>
             <a:r>
-              <a:rPr lang="en-US" sz="1400" dirty="0" smtClean="0"/>
+              <a:rPr lang="en-US" sz="1400" dirty="0"/>
               <a:t>Abhijith N V</a:t>
             </a:r>
-            <a:endParaRPr lang="en-IN" sz="1400" dirty="0" smtClean="0"/>
+            <a:endParaRPr lang="en-IN" sz="1400" dirty="0"/>
           </a:p>
         </p:txBody>
       </p:sp>
@@ -9527,13 +9630,6 @@
   <p:clrMapOvr>
     <a:masterClrMapping/>
   </p:clrMapOvr>
-  <p:timing>
-    <p:tnLst>
-      <p:par>
-        <p:cTn id="1" dur="indefinite" restart="never" nodeType="tmRoot"/>
-      </p:par>
-    </p:tnLst>
-  </p:timing>
 </p:sld>
 </file>
 
@@ -9559,7 +9655,7 @@
           <p:cNvPr id="6" name="Title 1">
             <a:extLst>
               <a:ext uri="{FF2B5EF4-FFF2-40B4-BE49-F238E27FC236}">
-                <a16:creationId xmlns="" xmlns:a16="http://schemas.microsoft.com/office/drawing/2014/main" id="{C9ED24FB-F1DF-43A2-A28A-E1B9714DF31A}"/>
+                <a16:creationId xmlns:a16="http://schemas.microsoft.com/office/drawing/2014/main" id="{C9ED24FB-F1DF-43A2-A28A-E1B9714DF31A}"/>
               </a:ext>
             </a:extLst>
           </p:cNvPr>
@@ -9583,10 +9679,238 @@
           <a:lstStyle/>
           <a:p>
             <a:r>
-              <a:rPr lang="en-IN" sz="3600" b="1" dirty="0" smtClean="0"/>
+              <a:rPr lang="en-IN" sz="3600" b="1" dirty="0"/>
+              <a:t>Home ownership impact</a:t>
+            </a:r>
+          </a:p>
+        </p:txBody>
+      </p:sp>
+      <p:sp>
+        <p:nvSpPr>
+          <p:cNvPr id="9" name="TextBox 8"/>
+          <p:cNvSpPr txBox="1"/>
+          <p:nvPr/>
+        </p:nvSpPr>
+        <p:spPr>
+          <a:xfrm>
+            <a:off x="8091377" y="1562986"/>
+            <a:ext cx="3949995" cy="4939814"/>
+          </a:xfrm>
+          <a:prstGeom prst="rect">
+            <a:avLst/>
+          </a:prstGeom>
+          <a:noFill/>
+        </p:spPr>
+        <p:txBody>
+          <a:bodyPr wrap="square" rtlCol="0">
+            <a:spAutoFit/>
+          </a:bodyPr>
+          <a:lstStyle/>
+          <a:p>
+            <a:pPr>
+              <a:lnSpc>
+                <a:spcPct val="150000"/>
+              </a:lnSpc>
+            </a:pPr>
+            <a:r>
+              <a:rPr lang="en-US" sz="1400" b="1" u="sng" dirty="0"/>
+              <a:t>Observations:</a:t>
+            </a:r>
+            <a:r>
+              <a:rPr lang="en-US" sz="1400" dirty="0"/>
+              <a:t> </a:t>
+            </a:r>
+          </a:p>
+          <a:p>
+            <a:pPr marL="285750" indent="-285750">
+              <a:lnSpc>
+                <a:spcPct val="150000"/>
+              </a:lnSpc>
+              <a:buFont typeface="Wingdings" panose="05000000000000000000" pitchFamily="2" charset="2"/>
+              <a:buChar char="Ø"/>
+            </a:pPr>
+            <a:r>
+              <a:rPr lang="en-US" sz="1400" dirty="0"/>
+              <a:t>Mortgage and rent have the highest loans given</a:t>
+            </a:r>
+          </a:p>
+          <a:p>
+            <a:pPr marL="285750" indent="-285750">
+              <a:lnSpc>
+                <a:spcPct val="150000"/>
+              </a:lnSpc>
+              <a:buFont typeface="Wingdings" panose="05000000000000000000" pitchFamily="2" charset="2"/>
+              <a:buChar char="Ø"/>
+            </a:pPr>
+            <a:r>
+              <a:rPr lang="en-US" sz="1400" dirty="0"/>
+              <a:t>Between mortgage, rent and own, rented and own home owners tend to default more compared to Mortgage</a:t>
+            </a:r>
+          </a:p>
+          <a:p>
+            <a:pPr marL="285750" indent="-285750">
+              <a:lnSpc>
+                <a:spcPct val="150000"/>
+              </a:lnSpc>
+              <a:buFont typeface="Wingdings" panose="05000000000000000000" pitchFamily="2" charset="2"/>
+              <a:buChar char="Ø"/>
+            </a:pPr>
+            <a:r>
+              <a:rPr lang="en-US" sz="1400" dirty="0"/>
+              <a:t>Although not many loans under others, it has a significant percentage of loan defaulting (&gt;20%)</a:t>
+            </a:r>
+          </a:p>
+          <a:p>
+            <a:pPr>
+              <a:lnSpc>
+                <a:spcPct val="150000"/>
+              </a:lnSpc>
+            </a:pPr>
+            <a:r>
+              <a:rPr lang="en-US" sz="1400" b="1" u="sng" dirty="0"/>
+              <a:t>Inferences:</a:t>
+            </a:r>
+            <a:r>
+              <a:rPr lang="en-US" sz="1400" dirty="0"/>
+              <a:t> </a:t>
+            </a:r>
+          </a:p>
+          <a:p>
+            <a:pPr marL="285750" indent="-285750">
+              <a:lnSpc>
+                <a:spcPct val="150000"/>
+              </a:lnSpc>
+              <a:buFont typeface="Wingdings" panose="05000000000000000000" pitchFamily="2" charset="2"/>
+              <a:buChar char="Ø"/>
+            </a:pPr>
+            <a:r>
+              <a:rPr lang="en-US" sz="1400" dirty="0"/>
+              <a:t>Others is an undefined category, need more data to understand why it has more defaults</a:t>
+            </a:r>
+          </a:p>
+          <a:p>
+            <a:pPr marL="285750" indent="-285750">
+              <a:lnSpc>
+                <a:spcPct val="150000"/>
+              </a:lnSpc>
+              <a:buFont typeface="Wingdings" panose="05000000000000000000" pitchFamily="2" charset="2"/>
+              <a:buChar char="Ø"/>
+            </a:pPr>
+            <a:r>
+              <a:rPr lang="en-US" sz="1400" dirty="0"/>
+              <a:t>Mortgage has lower percentage of default. Since mortgage is a major loan and any default on other loan will increase the </a:t>
+            </a:r>
+            <a:r>
+              <a:rPr lang="en-US" sz="1400" dirty="0" err="1"/>
+              <a:t>RoI</a:t>
+            </a:r>
+            <a:r>
+              <a:rPr lang="en-US" sz="1400" dirty="0"/>
+              <a:t> or loan </a:t>
+            </a:r>
+            <a:r>
+              <a:rPr lang="en-US" sz="1400" dirty="0" err="1"/>
+              <a:t>categrory</a:t>
+            </a:r>
+            <a:r>
+              <a:rPr lang="en-US" sz="1400" dirty="0"/>
+              <a:t>, hence Mortgage owners tends to pay back and have a less risk of defaulting</a:t>
+            </a:r>
+          </a:p>
+        </p:txBody>
+      </p:sp>
+      <p:pic>
+        <p:nvPicPr>
+          <p:cNvPr id="5" name="Picture 4"/>
+          <p:cNvPicPr>
+            <a:picLocks noChangeAspect="1"/>
+          </p:cNvPicPr>
+          <p:nvPr/>
+        </p:nvPicPr>
+        <p:blipFill>
+          <a:blip r:embed="rId2">
+            <a:extLst>
+              <a:ext uri="{28A0092B-C50C-407E-A947-70E740481C1C}">
+                <a14:useLocalDpi xmlns:a14="http://schemas.microsoft.com/office/drawing/2010/main" val="0"/>
+              </a:ext>
+            </a:extLst>
+          </a:blip>
+          <a:stretch>
+            <a:fillRect/>
+          </a:stretch>
+        </p:blipFill>
+        <p:spPr>
+          <a:xfrm>
+            <a:off x="318446" y="1656474"/>
+            <a:ext cx="7028652" cy="4414717"/>
+          </a:xfrm>
+          <a:prstGeom prst="rect">
+            <a:avLst/>
+          </a:prstGeom>
+        </p:spPr>
+      </p:pic>
+    </p:spTree>
+    <p:extLst>
+      <p:ext uri="{BB962C8B-B14F-4D97-AF65-F5344CB8AC3E}">
+        <p14:creationId xmlns:p14="http://schemas.microsoft.com/office/powerpoint/2010/main" val="3095347154"/>
+      </p:ext>
+    </p:extLst>
+  </p:cSld>
+  <p:clrMapOvr>
+    <a:masterClrMapping/>
+  </p:clrMapOvr>
+</p:sld>
+</file>
+
+<file path=ppt/slides/slide11.xml><?xml version="1.0" encoding="utf-8"?>
+<p:sld xmlns:a="http://schemas.openxmlformats.org/drawingml/2006/main" xmlns:r="http://schemas.openxmlformats.org/officeDocument/2006/relationships" xmlns:p="http://schemas.openxmlformats.org/presentationml/2006/main">
+  <p:cSld>
+    <p:spTree>
+      <p:nvGrpSpPr>
+        <p:cNvPr id="1" name=""/>
+        <p:cNvGrpSpPr/>
+        <p:nvPr/>
+      </p:nvGrpSpPr>
+      <p:grpSpPr>
+        <a:xfrm>
+          <a:off x="0" y="0"/>
+          <a:ext cx="0" cy="0"/>
+          <a:chOff x="0" y="0"/>
+          <a:chExt cx="0" cy="0"/>
+        </a:xfrm>
+      </p:grpSpPr>
+      <p:sp>
+        <p:nvSpPr>
+          <p:cNvPr id="6" name="Title 1">
+            <a:extLst>
+              <a:ext uri="{FF2B5EF4-FFF2-40B4-BE49-F238E27FC236}">
+                <a16:creationId xmlns:a16="http://schemas.microsoft.com/office/drawing/2014/main" id="{C9ED24FB-F1DF-43A2-A28A-E1B9714DF31A}"/>
+              </a:ext>
+            </a:extLst>
+          </p:cNvPr>
+          <p:cNvSpPr>
+            <a:spLocks noGrp="1"/>
+          </p:cNvSpPr>
+          <p:nvPr>
+            <p:ph type="title"/>
+          </p:nvPr>
+        </p:nvSpPr>
+        <p:spPr>
+          <a:xfrm>
+            <a:off x="404949" y="800336"/>
+            <a:ext cx="11168742" cy="856138"/>
+          </a:xfrm>
+        </p:spPr>
+        <p:txBody>
+          <a:bodyPr>
+            <a:normAutofit/>
+          </a:bodyPr>
+          <a:lstStyle/>
+          <a:p>
+            <a:r>
+              <a:rPr lang="en-IN" sz="3600" b="1" dirty="0"/>
               <a:t>Loan purpose impact</a:t>
             </a:r>
-            <a:endParaRPr lang="en-IN" sz="3600" b="1" dirty="0"/>
           </a:p>
         </p:txBody>
       </p:sp>
@@ -9618,11 +9942,11 @@
               </a:lnSpc>
             </a:pPr>
             <a:r>
-              <a:rPr lang="en-US" sz="1400" b="1" u="sng" dirty="0" smtClean="0"/>
+              <a:rPr lang="en-US" sz="1400" b="1" u="sng" dirty="0"/>
               <a:t>Observations:</a:t>
             </a:r>
             <a:r>
-              <a:rPr lang="en-US" sz="1400" dirty="0" smtClean="0"/>
+              <a:rPr lang="en-US" sz="1400" dirty="0"/>
               <a:t> </a:t>
             </a:r>
           </a:p>
@@ -9635,7 +9959,7 @@
               <a:buChar char="Ø"/>
             </a:pPr>
             <a:r>
-              <a:rPr lang="en-US" sz="1400" dirty="0" smtClean="0"/>
+              <a:rPr lang="en-US" sz="1400" dirty="0"/>
               <a:t>Debt consolidation has the highest loan applications are for</a:t>
             </a:r>
           </a:p>
@@ -9648,7 +9972,7 @@
               <a:buChar char="Ø"/>
             </a:pPr>
             <a:r>
-              <a:rPr lang="en-US" sz="1400" dirty="0" smtClean="0"/>
+              <a:rPr lang="en-US" sz="1400" dirty="0"/>
               <a:t>Small Business has the highest default percentage followed by renewal energy</a:t>
             </a:r>
           </a:p>
@@ -9659,15 +9983,11 @@
               </a:lnSpc>
             </a:pPr>
             <a:r>
-              <a:rPr lang="en-US" sz="1400" b="1" u="sng" dirty="0" smtClean="0"/>
-              <a:t>Inferences</a:t>
+              <a:rPr lang="en-US" sz="1400" b="1" u="sng" dirty="0"/>
+              <a:t>Inferences:</a:t>
             </a:r>
             <a:r>
-              <a:rPr lang="en-US" sz="1400" b="1" u="sng" dirty="0" smtClean="0"/>
-              <a:t>:</a:t>
-            </a:r>
-            <a:r>
-              <a:rPr lang="en-US" sz="1400" dirty="0" smtClean="0"/>
+              <a:rPr lang="en-US" sz="1400" dirty="0"/>
               <a:t> </a:t>
             </a:r>
           </a:p>
@@ -9680,14 +10000,9 @@
               <a:buChar char="Ø"/>
             </a:pPr>
             <a:r>
-              <a:rPr lang="en-US" sz="1400" dirty="0" smtClean="0"/>
-              <a:t>People take loan with better </a:t>
+              <a:rPr lang="en-US" sz="1400" dirty="0"/>
+              <a:t>People take loan with better rate to consolidate their loans</a:t>
             </a:r>
-            <a:r>
-              <a:rPr lang="en-US" sz="1400" dirty="0" smtClean="0"/>
-              <a:t>rate to consolidate their loans</a:t>
-            </a:r>
-            <a:endParaRPr lang="en-US" sz="1400" dirty="0" smtClean="0"/>
           </a:p>
           <a:p>
             <a:pPr marL="285750" indent="-285750">
@@ -9698,10 +10013,9 @@
               <a:buChar char="Ø"/>
             </a:pPr>
             <a:r>
-              <a:rPr lang="en-US" sz="1400" dirty="0" smtClean="0"/>
+              <a:rPr lang="en-US" sz="1400" dirty="0"/>
               <a:t>Small business have high risk of failure, hence loan default is also quite high</a:t>
             </a:r>
-            <a:endParaRPr lang="en-US" sz="1400" dirty="0"/>
           </a:p>
         </p:txBody>
       </p:sp>
@@ -9784,17 +10098,10 @@
   <p:clrMapOvr>
     <a:masterClrMapping/>
   </p:clrMapOvr>
-  <p:timing>
-    <p:tnLst>
-      <p:par>
-        <p:cTn id="1" dur="indefinite" restart="never" nodeType="tmRoot"/>
-      </p:par>
-    </p:tnLst>
-  </p:timing>
 </p:sld>
 </file>
 
-<file path=ppt/slides/slide11.xml><?xml version="1.0" encoding="utf-8"?>
+<file path=ppt/slides/slide12.xml><?xml version="1.0" encoding="utf-8"?>
 <p:sld xmlns:a="http://schemas.openxmlformats.org/drawingml/2006/main" xmlns:r="http://schemas.openxmlformats.org/officeDocument/2006/relationships" xmlns:p="http://schemas.openxmlformats.org/presentationml/2006/main">
   <p:cSld>
     <p:spTree>
@@ -9816,7 +10123,7 @@
           <p:cNvPr id="6" name="Title 1">
             <a:extLst>
               <a:ext uri="{FF2B5EF4-FFF2-40B4-BE49-F238E27FC236}">
-                <a16:creationId xmlns="" xmlns:a16="http://schemas.microsoft.com/office/drawing/2014/main" id="{C9ED24FB-F1DF-43A2-A28A-E1B9714DF31A}"/>
+                <a16:creationId xmlns:a16="http://schemas.microsoft.com/office/drawing/2014/main" id="{C9ED24FB-F1DF-43A2-A28A-E1B9714DF31A}"/>
               </a:ext>
             </a:extLst>
           </p:cNvPr>
@@ -9840,10 +10147,9 @@
           <a:lstStyle/>
           <a:p>
             <a:r>
-              <a:rPr lang="en-IN" sz="3600" b="1" dirty="0" smtClean="0"/>
+              <a:rPr lang="en-IN" sz="3600" b="1" dirty="0"/>
               <a:t>Loan purpose impact</a:t>
             </a:r>
-            <a:endParaRPr lang="en-IN" sz="3600" b="1" dirty="0"/>
           </a:p>
         </p:txBody>
       </p:sp>
@@ -9875,11 +10181,11 @@
               </a:lnSpc>
             </a:pPr>
             <a:r>
-              <a:rPr lang="en-US" sz="1400" b="1" u="sng" dirty="0" smtClean="0"/>
+              <a:rPr lang="en-US" sz="1400" b="1" u="sng" dirty="0"/>
               <a:t>Observations:</a:t>
             </a:r>
             <a:r>
-              <a:rPr lang="en-US" sz="1400" dirty="0" smtClean="0"/>
+              <a:rPr lang="en-US" sz="1400" dirty="0"/>
               <a:t> </a:t>
             </a:r>
           </a:p>
@@ -9892,7 +10198,7 @@
               <a:buChar char="Ø"/>
             </a:pPr>
             <a:r>
-              <a:rPr lang="en-US" sz="1400" dirty="0" smtClean="0"/>
+              <a:rPr lang="en-US" sz="1400" dirty="0"/>
               <a:t>Highest loans are given without any  applications verification</a:t>
             </a:r>
           </a:p>
@@ -9905,7 +10211,7 @@
               <a:buChar char="Ø"/>
             </a:pPr>
             <a:r>
-              <a:rPr lang="en-US" sz="1400" dirty="0" smtClean="0"/>
+              <a:rPr lang="en-US" sz="1400" dirty="0"/>
               <a:t>Verified loans have the highest default percentage</a:t>
             </a:r>
           </a:p>
@@ -9916,15 +10222,11 @@
               </a:lnSpc>
             </a:pPr>
             <a:r>
-              <a:rPr lang="en-US" sz="1400" b="1" u="sng" dirty="0" smtClean="0"/>
-              <a:t>Inferences</a:t>
+              <a:rPr lang="en-US" sz="1400" b="1" u="sng" dirty="0"/>
+              <a:t>Inferences:</a:t>
             </a:r>
             <a:r>
-              <a:rPr lang="en-US" sz="1400" b="1" u="sng" dirty="0" smtClean="0"/>
-              <a:t>:</a:t>
-            </a:r>
-            <a:r>
-              <a:rPr lang="en-US" sz="1400" dirty="0" smtClean="0"/>
+              <a:rPr lang="en-US" sz="1400" dirty="0"/>
               <a:t> </a:t>
             </a:r>
           </a:p>
@@ -9937,26 +10239,9 @@
               <a:buChar char="Ø"/>
             </a:pPr>
             <a:r>
-              <a:rPr lang="en-US" sz="1400" dirty="0" smtClean="0"/>
-              <a:t>Verification process need to be relooked into to see what are </a:t>
+              <a:rPr lang="en-US" sz="1400" dirty="0"/>
+              <a:t>Verification process need to be relooked into to see what are the reasons for default even after verification</a:t>
             </a:r>
-            <a:r>
-              <a:rPr lang="en-US" sz="1400" smtClean="0"/>
-              <a:t>the reasons </a:t>
-            </a:r>
-            <a:r>
-              <a:rPr lang="en-US" sz="1400" dirty="0" smtClean="0"/>
-              <a:t>for default </a:t>
-            </a:r>
-            <a:r>
-              <a:rPr lang="en-US" sz="1400" dirty="0" err="1" smtClean="0"/>
-              <a:t>een</a:t>
-            </a:r>
-            <a:r>
-              <a:rPr lang="en-US" sz="1400" dirty="0" smtClean="0"/>
-              <a:t> after verification</a:t>
-            </a:r>
-            <a:endParaRPr lang="en-US" sz="1400" dirty="0"/>
           </a:p>
         </p:txBody>
       </p:sp>
@@ -10008,7 +10293,7 @@
           <p:nvPr/>
         </p:nvPicPr>
         <p:blipFill>
-          <a:blip r:embed="rId2">
+          <a:blip r:embed="rId3">
             <a:extLst>
               <a:ext uri="{28A0092B-C50C-407E-A947-70E740481C1C}">
                 <a14:useLocalDpi xmlns:a14="http://schemas.microsoft.com/office/drawing/2010/main" val="0"/>
@@ -10039,17 +10324,10 @@
   <p:clrMapOvr>
     <a:masterClrMapping/>
   </p:clrMapOvr>
-  <p:timing>
-    <p:tnLst>
-      <p:par>
-        <p:cTn id="1" dur="indefinite" restart="never" nodeType="tmRoot"/>
-      </p:par>
-    </p:tnLst>
-  </p:timing>
 </p:sld>
 </file>
 
-<file path=ppt/slides/slide12.xml><?xml version="1.0" encoding="utf-8"?>
+<file path=ppt/slides/slide13.xml><?xml version="1.0" encoding="utf-8"?>
 <p:sld xmlns:a="http://schemas.openxmlformats.org/drawingml/2006/main" xmlns:r="http://schemas.openxmlformats.org/officeDocument/2006/relationships" xmlns:p="http://schemas.openxmlformats.org/presentationml/2006/main">
   <p:cSld>
     <p:spTree>
@@ -10071,7 +10349,7 @@
           <p:cNvPr id="6" name="Title 1">
             <a:extLst>
               <a:ext uri="{FF2B5EF4-FFF2-40B4-BE49-F238E27FC236}">
-                <a16:creationId xmlns="" xmlns:a16="http://schemas.microsoft.com/office/drawing/2014/main" id="{C9ED24FB-F1DF-43A2-A28A-E1B9714DF31A}"/>
+                <a16:creationId xmlns:a16="http://schemas.microsoft.com/office/drawing/2014/main" id="{C9ED24FB-F1DF-43A2-A28A-E1B9714DF31A}"/>
               </a:ext>
             </a:extLst>
           </p:cNvPr>
@@ -10095,10 +10373,9 @@
           <a:lstStyle/>
           <a:p>
             <a:r>
-              <a:rPr lang="en-IN" sz="3200" b="1" dirty="0" smtClean="0"/>
+              <a:rPr lang="en-IN" sz="3200" b="1" dirty="0"/>
               <a:t>Conclusions</a:t>
             </a:r>
-            <a:endParaRPr lang="en-IN" sz="3200" b="1" dirty="0"/>
           </a:p>
         </p:txBody>
       </p:sp>
@@ -10134,13 +10411,6 @@
   <p:clrMapOvr>
     <a:masterClrMapping/>
   </p:clrMapOvr>
-  <p:timing>
-    <p:tnLst>
-      <p:par>
-        <p:cTn id="1" dur="indefinite" restart="never" nodeType="tmRoot"/>
-      </p:par>
-    </p:tnLst>
-  </p:timing>
 </p:sld>
 </file>
 
@@ -10185,66 +10455,47 @@
           <a:p>
             <a:r>
               <a:rPr lang="en-IN" dirty="0"/>
-              <a:t>Identify </a:t>
+              <a:t>Identify driving factors that influence loan default</a:t>
             </a:r>
+          </a:p>
+          <a:p>
+            <a:endParaRPr lang="en-IN" dirty="0"/>
+          </a:p>
+          <a:p>
             <a:r>
-              <a:rPr lang="en-IN" dirty="0" smtClean="0"/>
-              <a:t>driving </a:t>
-            </a:r>
-            <a:r>
-              <a:rPr lang="en-IN" dirty="0" smtClean="0"/>
-              <a:t>factors that influence loan default</a:t>
-            </a:r>
-          </a:p>
-          <a:p>
-            <a:endParaRPr lang="en-IN" dirty="0" smtClean="0"/>
-          </a:p>
-          <a:p>
-            <a:r>
-              <a:rPr lang="en-IN" dirty="0" smtClean="0"/>
+              <a:rPr lang="en-IN" dirty="0"/>
               <a:t>Identify driver variables which are a strong indicators of default</a:t>
             </a:r>
+          </a:p>
+          <a:p>
             <a:endParaRPr lang="en-IN" dirty="0"/>
           </a:p>
           <a:p>
-            <a:endParaRPr lang="en-IN" dirty="0"/>
-          </a:p>
-          <a:p>
-            <a:r>
-              <a:rPr lang="en-IN" dirty="0" smtClean="0"/>
-              <a:t>Ensure </a:t>
-            </a:r>
             <a:r>
               <a:rPr lang="en-IN" dirty="0"/>
-              <a:t>that the </a:t>
+              <a:t>Ensure that the inferences are</a:t>
             </a:r>
-            <a:r>
-              <a:rPr lang="en-IN" dirty="0" smtClean="0"/>
-              <a:t>hypothesis/analyses are</a:t>
-            </a:r>
-            <a:endParaRPr lang="en-IN" dirty="0"/>
           </a:p>
           <a:p>
             <a:pPr lvl="1"/>
             <a:r>
-              <a:rPr lang="en-IN" sz="2000" dirty="0" smtClean="0"/>
+              <a:rPr lang="en-IN" sz="2000" dirty="0"/>
               <a:t>Data driven</a:t>
             </a:r>
           </a:p>
           <a:p>
             <a:pPr lvl="1"/>
             <a:r>
-              <a:rPr lang="en-IN" sz="2000" dirty="0" smtClean="0"/>
+              <a:rPr lang="en-IN" sz="2000" dirty="0"/>
               <a:t>Explained through visualizations</a:t>
             </a:r>
           </a:p>
           <a:p>
             <a:pPr lvl="1"/>
             <a:r>
-              <a:rPr lang="en-IN" sz="2000" dirty="0" smtClean="0"/>
+              <a:rPr lang="en-IN" sz="2000" dirty="0"/>
               <a:t>Inferences are made based on correct trends</a:t>
             </a:r>
-            <a:endParaRPr lang="en-IN" sz="2000" dirty="0"/>
           </a:p>
           <a:p>
             <a:endParaRPr lang="en-IN" sz="1800" dirty="0"/>
@@ -10290,13 +10541,6 @@
   <p:clrMapOvr>
     <a:masterClrMapping/>
   </p:clrMapOvr>
-  <p:timing>
-    <p:tnLst>
-      <p:par>
-        <p:cTn id="1" dur="indefinite" restart="never" nodeType="tmRoot"/>
-      </p:par>
-    </p:tnLst>
-  </p:timing>
 </p:sld>
 </file>
 
@@ -10345,16 +10589,8 @@
               </a:lnSpc>
             </a:pPr>
             <a:r>
-              <a:rPr lang="en-US" sz="2400" dirty="0" smtClean="0"/>
-              <a:t>Loan </a:t>
-            </a:r>
-            <a:r>
               <a:rPr lang="en-US" sz="2400" dirty="0"/>
-              <a:t>data for all loans issued through the time period 2007 </a:t>
-            </a:r>
-            <a:r>
-              <a:rPr lang="en-US" sz="2400" dirty="0" smtClean="0"/>
-              <a:t>to 2011from lending club</a:t>
+              <a:t>Loan data for all loans issued through the time period 2007 to 2011from lending club</a:t>
             </a:r>
           </a:p>
           <a:p>
@@ -10364,7 +10600,7 @@
               </a:lnSpc>
             </a:pPr>
             <a:r>
-              <a:rPr lang="en-US" sz="2400" dirty="0" smtClean="0"/>
+              <a:rPr lang="en-US" sz="2400" dirty="0"/>
               <a:t>Loans rejected by lending club data is not available in the data set</a:t>
             </a:r>
           </a:p>
@@ -10375,7 +10611,7 @@
               </a:lnSpc>
             </a:pPr>
             <a:r>
-              <a:rPr lang="en-US" sz="2400" dirty="0" smtClean="0"/>
+              <a:rPr lang="en-US" sz="2400" dirty="0"/>
               <a:t>Loans have 3 statuses</a:t>
             </a:r>
           </a:p>
@@ -10386,7 +10622,7 @@
               </a:lnSpc>
             </a:pPr>
             <a:r>
-              <a:rPr lang="en-US" sz="2000" dirty="0" smtClean="0"/>
+              <a:rPr lang="en-US" sz="2000" dirty="0"/>
               <a:t>Fully Paid – Loans that are closed</a:t>
             </a:r>
           </a:p>
@@ -10397,7 +10633,7 @@
               </a:lnSpc>
             </a:pPr>
             <a:r>
-              <a:rPr lang="en-US" sz="2000" dirty="0" smtClean="0"/>
+              <a:rPr lang="en-US" sz="2000" dirty="0"/>
               <a:t>Current – Ongoing loans</a:t>
             </a:r>
           </a:p>
@@ -10408,17 +10644,16 @@
               </a:lnSpc>
             </a:pPr>
             <a:r>
-              <a:rPr lang="en-US" sz="2000" dirty="0" smtClean="0"/>
+              <a:rPr lang="en-US" sz="2000" dirty="0"/>
               <a:t>Charged Off – Loans that are defaulted by the customers</a:t>
             </a:r>
-            <a:endParaRPr lang="en-IN" sz="2000" dirty="0" smtClean="0"/>
+            <a:endParaRPr lang="en-IN" sz="2000" dirty="0"/>
           </a:p>
           <a:p>
             <a:r>
-              <a:rPr lang="en-IN" sz="2400" dirty="0" smtClean="0"/>
+              <a:rPr lang="en-IN" sz="2400" dirty="0"/>
               <a:t>Few key columns and our understanding of those columns are listed in the next slide</a:t>
             </a:r>
-            <a:endParaRPr lang="en-IN" sz="2400" dirty="0" smtClean="0"/>
           </a:p>
         </p:txBody>
       </p:sp>
@@ -10445,12 +10680,8 @@
           <a:lstStyle/>
           <a:p>
             <a:r>
-              <a:rPr lang="en-IN" sz="3600" b="1" dirty="0" smtClean="0"/>
-              <a:t>What Data we have</a:t>
-            </a:r>
-            <a:r>
               <a:rPr lang="en-IN" sz="3600" b="1" dirty="0"/>
-              <a:t>	</a:t>
+              <a:t>What Data we have	</a:t>
             </a:r>
           </a:p>
         </p:txBody>
@@ -10465,13 +10696,6 @@
   <p:clrMapOvr>
     <a:masterClrMapping/>
   </p:clrMapOvr>
-  <p:timing>
-    <p:tnLst>
-      <p:par>
-        <p:cTn id="1" dur="indefinite" restart="never" nodeType="tmRoot"/>
-      </p:par>
-    </p:tnLst>
-  </p:timing>
 </p:sld>
 </file>
 
@@ -10517,8 +10741,20 @@
                 <a:tableStyleId>{5C22544A-7EE6-4342-B048-85BDC9FD1C3A}</a:tableStyleId>
               </a:tblPr>
               <a:tblGrid>
-                <a:gridCol w="2103519"/>
-                <a:gridCol w="9252055"/>
+                <a:gridCol w="2103519">
+                  <a:extLst>
+                    <a:ext uri="{9D8B030D-6E8A-4147-A177-3AD203B41FA5}">
+                      <a16:colId xmlns:a16="http://schemas.microsoft.com/office/drawing/2014/main" val="20000"/>
+                    </a:ext>
+                  </a:extLst>
+                </a:gridCol>
+                <a:gridCol w="9252055">
+                  <a:extLst>
+                    <a:ext uri="{9D8B030D-6E8A-4147-A177-3AD203B41FA5}">
+                      <a16:colId xmlns:a16="http://schemas.microsoft.com/office/drawing/2014/main" val="20001"/>
+                    </a:ext>
+                  </a:extLst>
+                </a:gridCol>
               </a:tblGrid>
               <a:tr h="271158">
                 <a:tc>
@@ -10528,7 +10764,7 @@
                     <a:p>
                       <a:pPr algn="ctr" fontAlgn="b"/>
                       <a:r>
-                        <a:rPr lang="en-US" sz="1400" b="1" i="0" u="none" strike="noStrike" dirty="0" smtClean="0">
+                        <a:rPr lang="en-US" sz="1400" b="1" i="0" u="none" strike="noStrike" dirty="0">
                           <a:solidFill>
                             <a:srgbClr val="000000"/>
                           </a:solidFill>
@@ -10539,7 +10775,7 @@
                         <a:t>Column</a:t>
                       </a:r>
                       <a:r>
-                        <a:rPr lang="en-US" sz="1400" b="1" i="0" u="none" strike="noStrike" baseline="0" dirty="0" smtClean="0">
+                        <a:rPr lang="en-US" sz="1400" b="1" i="0" u="none" strike="noStrike" baseline="0" dirty="0">
                           <a:solidFill>
                             <a:srgbClr val="000000"/>
                           </a:solidFill>
@@ -10610,7 +10846,7 @@
                     <a:p>
                       <a:pPr algn="ctr" fontAlgn="b"/>
                       <a:r>
-                        <a:rPr lang="en-US" sz="1400" b="1" i="0" u="none" strike="noStrike" dirty="0" smtClean="0">
+                        <a:rPr lang="en-US" sz="1400" b="1" i="0" u="none" strike="noStrike" dirty="0">
                           <a:solidFill>
                             <a:srgbClr val="000000"/>
                           </a:solidFill>
@@ -10620,14 +10856,6 @@
                         </a:rPr>
                         <a:t> Explanation</a:t>
                       </a:r>
-                      <a:endParaRPr lang="en-US" sz="1400" b="1" i="0" u="none" strike="noStrike" dirty="0">
-                        <a:solidFill>
-                          <a:srgbClr val="000000"/>
-                        </a:solidFill>
-                        <a:effectLst/>
-                        <a:latin typeface="Times New Roman" panose="02020603050405020304" pitchFamily="18" charset="0"/>
-                        <a:cs typeface="Times New Roman" panose="02020603050405020304" pitchFamily="18" charset="0"/>
-                      </a:endParaRPr>
                     </a:p>
                   </a:txBody>
                   <a:tcPr marL="513" marR="513" marT="513" marB="0" anchor="ctr">
@@ -10674,6 +10902,11 @@
                     </a:solidFill>
                   </a:tcPr>
                 </a:tc>
+                <a:extLst>
+                  <a:ext uri="{0D108BD9-81ED-4DB2-BD59-A6C34878D82A}">
+                    <a16:rowId xmlns:a16="http://schemas.microsoft.com/office/drawing/2014/main" val="10000"/>
+                  </a:ext>
+                </a:extLst>
               </a:tr>
               <a:tr h="271158">
                 <a:tc>
@@ -10804,6 +11037,11 @@
                     <a:noFill/>
                   </a:tcPr>
                 </a:tc>
+                <a:extLst>
+                  <a:ext uri="{0D108BD9-81ED-4DB2-BD59-A6C34878D82A}">
+                    <a16:rowId xmlns:a16="http://schemas.microsoft.com/office/drawing/2014/main" val="10001"/>
+                  </a:ext>
+                </a:extLst>
               </a:tr>
               <a:tr h="383927">
                 <a:tc>
@@ -10934,6 +11172,11 @@
                     <a:noFill/>
                   </a:tcPr>
                 </a:tc>
+                <a:extLst>
+                  <a:ext uri="{0D108BD9-81ED-4DB2-BD59-A6C34878D82A}">
+                    <a16:rowId xmlns:a16="http://schemas.microsoft.com/office/drawing/2014/main" val="10002"/>
+                  </a:ext>
+                </a:extLst>
               </a:tr>
               <a:tr h="0">
                 <a:tc>
@@ -11064,6 +11307,11 @@
                     <a:noFill/>
                   </a:tcPr>
                 </a:tc>
+                <a:extLst>
+                  <a:ext uri="{0D108BD9-81ED-4DB2-BD59-A6C34878D82A}">
+                    <a16:rowId xmlns:a16="http://schemas.microsoft.com/office/drawing/2014/main" val="10003"/>
+                  </a:ext>
+                </a:extLst>
               </a:tr>
               <a:tr h="180943">
                 <a:tc>
@@ -11194,6 +11442,11 @@
                     <a:noFill/>
                   </a:tcPr>
                 </a:tc>
+                <a:extLst>
+                  <a:ext uri="{0D108BD9-81ED-4DB2-BD59-A6C34878D82A}">
+                    <a16:rowId xmlns:a16="http://schemas.microsoft.com/office/drawing/2014/main" val="10004"/>
+                  </a:ext>
+                </a:extLst>
               </a:tr>
               <a:tr h="0">
                 <a:tc>
@@ -11324,6 +11577,11 @@
                     <a:noFill/>
                   </a:tcPr>
                 </a:tc>
+                <a:extLst>
+                  <a:ext uri="{0D108BD9-81ED-4DB2-BD59-A6C34878D82A}">
+                    <a16:rowId xmlns:a16="http://schemas.microsoft.com/office/drawing/2014/main" val="10005"/>
+                  </a:ext>
+                </a:extLst>
               </a:tr>
               <a:tr h="147625">
                 <a:tc>
@@ -11454,6 +11712,11 @@
                     <a:noFill/>
                   </a:tcPr>
                 </a:tc>
+                <a:extLst>
+                  <a:ext uri="{0D108BD9-81ED-4DB2-BD59-A6C34878D82A}">
+                    <a16:rowId xmlns:a16="http://schemas.microsoft.com/office/drawing/2014/main" val="10006"/>
+                  </a:ext>
+                </a:extLst>
               </a:tr>
               <a:tr h="135835">
                 <a:tc>
@@ -11584,6 +11847,11 @@
                     <a:noFill/>
                   </a:tcPr>
                 </a:tc>
+                <a:extLst>
+                  <a:ext uri="{0D108BD9-81ED-4DB2-BD59-A6C34878D82A}">
+                    <a16:rowId xmlns:a16="http://schemas.microsoft.com/office/drawing/2014/main" val="10007"/>
+                  </a:ext>
+                </a:extLst>
               </a:tr>
               <a:tr h="135835">
                 <a:tc>
@@ -11714,6 +11982,11 @@
                     <a:noFill/>
                   </a:tcPr>
                 </a:tc>
+                <a:extLst>
+                  <a:ext uri="{0D108BD9-81ED-4DB2-BD59-A6C34878D82A}">
+                    <a16:rowId xmlns:a16="http://schemas.microsoft.com/office/drawing/2014/main" val="10008"/>
+                  </a:ext>
+                </a:extLst>
               </a:tr>
               <a:tr h="226050">
                 <a:tc>
@@ -11844,6 +12117,11 @@
                     <a:noFill/>
                   </a:tcPr>
                 </a:tc>
+                <a:extLst>
+                  <a:ext uri="{0D108BD9-81ED-4DB2-BD59-A6C34878D82A}">
+                    <a16:rowId xmlns:a16="http://schemas.microsoft.com/office/drawing/2014/main" val="10009"/>
+                  </a:ext>
+                </a:extLst>
               </a:tr>
               <a:tr h="180943">
                 <a:tc>
@@ -11974,6 +12252,11 @@
                     <a:noFill/>
                   </a:tcPr>
                 </a:tc>
+                <a:extLst>
+                  <a:ext uri="{0D108BD9-81ED-4DB2-BD59-A6C34878D82A}">
+                    <a16:rowId xmlns:a16="http://schemas.microsoft.com/office/drawing/2014/main" val="10010"/>
+                  </a:ext>
+                </a:extLst>
               </a:tr>
               <a:tr h="438419">
                 <a:tc>
@@ -12120,6 +12403,11 @@
                     <a:noFill/>
                   </a:tcPr>
                 </a:tc>
+                <a:extLst>
+                  <a:ext uri="{0D108BD9-81ED-4DB2-BD59-A6C34878D82A}">
+                    <a16:rowId xmlns:a16="http://schemas.microsoft.com/office/drawing/2014/main" val="10011"/>
+                  </a:ext>
+                </a:extLst>
               </a:tr>
               <a:tr h="0">
                 <a:tc>
@@ -12258,6 +12546,11 @@
                     <a:noFill/>
                   </a:tcPr>
                 </a:tc>
+                <a:extLst>
+                  <a:ext uri="{0D108BD9-81ED-4DB2-BD59-A6C34878D82A}">
+                    <a16:rowId xmlns:a16="http://schemas.microsoft.com/office/drawing/2014/main" val="10012"/>
+                  </a:ext>
+                </a:extLst>
               </a:tr>
               <a:tr h="316265">
                 <a:tc>
@@ -12388,6 +12681,11 @@
                     <a:noFill/>
                   </a:tcPr>
                 </a:tc>
+                <a:extLst>
+                  <a:ext uri="{0D108BD9-81ED-4DB2-BD59-A6C34878D82A}">
+                    <a16:rowId xmlns:a16="http://schemas.microsoft.com/office/drawing/2014/main" val="10013"/>
+                  </a:ext>
+                </a:extLst>
               </a:tr>
               <a:tr h="365478">
                 <a:tc>
@@ -12534,6 +12832,11 @@
                     <a:noFill/>
                   </a:tcPr>
                 </a:tc>
+                <a:extLst>
+                  <a:ext uri="{0D108BD9-81ED-4DB2-BD59-A6C34878D82A}">
+                    <a16:rowId xmlns:a16="http://schemas.microsoft.com/office/drawing/2014/main" val="10014"/>
+                  </a:ext>
+                </a:extLst>
               </a:tr>
               <a:tr h="158389">
                 <a:tc>
@@ -12612,23 +12915,7 @@
                           <a:latin typeface="Times New Roman" panose="02020603050405020304" pitchFamily="18" charset="0"/>
                           <a:cs typeface="Times New Roman" panose="02020603050405020304" pitchFamily="18" charset="0"/>
                         </a:rPr>
-                        <a:t>loan term</a:t>
-                      </a:r>
-                      <a:r>
-                        <a:rPr lang="en-US" sz="1100" u="none" strike="noStrike" dirty="0" smtClean="0">
-                          <a:effectLst/>
-                          <a:latin typeface="Times New Roman" panose="02020603050405020304" pitchFamily="18" charset="0"/>
-                          <a:cs typeface="Times New Roman" panose="02020603050405020304" pitchFamily="18" charset="0"/>
-                        </a:rPr>
-                        <a:t>. Only </a:t>
-                      </a:r>
-                      <a:r>
-                        <a:rPr lang="en-US" sz="1100" u="none" strike="noStrike" dirty="0">
-                          <a:effectLst/>
-                          <a:latin typeface="Times New Roman" panose="02020603050405020304" pitchFamily="18" charset="0"/>
-                          <a:cs typeface="Times New Roman" panose="02020603050405020304" pitchFamily="18" charset="0"/>
-                        </a:rPr>
-                        <a:t>2 term is available 36 months and 60 months</a:t>
+                        <a:t>loan term. Only 2 term is available 36 months and 60 months</a:t>
                       </a:r>
                       <a:endParaRPr lang="en-US" sz="1100" b="0" i="0" u="none" strike="noStrike" dirty="0">
                         <a:solidFill>
@@ -12680,6 +12967,11 @@
                     <a:noFill/>
                   </a:tcPr>
                 </a:tc>
+                <a:extLst>
+                  <a:ext uri="{0D108BD9-81ED-4DB2-BD59-A6C34878D82A}">
+                    <a16:rowId xmlns:a16="http://schemas.microsoft.com/office/drawing/2014/main" val="10015"/>
+                  </a:ext>
+                </a:extLst>
               </a:tr>
               <a:tr h="135835">
                 <a:tc>
@@ -12810,6 +13102,11 @@
                     <a:noFill/>
                   </a:tcPr>
                 </a:tc>
+                <a:extLst>
+                  <a:ext uri="{0D108BD9-81ED-4DB2-BD59-A6C34878D82A}">
+                    <a16:rowId xmlns:a16="http://schemas.microsoft.com/office/drawing/2014/main" val="10016"/>
+                  </a:ext>
+                </a:extLst>
               </a:tr>
               <a:tr h="0">
                 <a:tc>
@@ -12940,6 +13237,11 @@
                     <a:noFill/>
                   </a:tcPr>
                 </a:tc>
+                <a:extLst>
+                  <a:ext uri="{0D108BD9-81ED-4DB2-BD59-A6C34878D82A}">
+                    <a16:rowId xmlns:a16="http://schemas.microsoft.com/office/drawing/2014/main" val="10017"/>
+                  </a:ext>
+                </a:extLst>
               </a:tr>
               <a:tr h="389177">
                 <a:tc>
@@ -13070,6 +13372,11 @@
                     <a:noFill/>
                   </a:tcPr>
                 </a:tc>
+                <a:extLst>
+                  <a:ext uri="{0D108BD9-81ED-4DB2-BD59-A6C34878D82A}">
+                    <a16:rowId xmlns:a16="http://schemas.microsoft.com/office/drawing/2014/main" val="10018"/>
+                  </a:ext>
+                </a:extLst>
               </a:tr>
             </a:tbl>
           </a:graphicData>
@@ -13085,13 +13392,6 @@
   <p:clrMapOvr>
     <a:masterClrMapping/>
   </p:clrMapOvr>
-  <p:timing>
-    <p:tnLst>
-      <p:par>
-        <p:cTn id="1" dur="indefinite" restart="never" nodeType="tmRoot"/>
-      </p:par>
-    </p:tnLst>
-  </p:timing>
 </p:sld>
 </file>
 
@@ -13121,7 +13421,7 @@
           <p:nvPr>
             <p:extLst>
               <p:ext uri="{D42A27DB-BD31-4B8C-83A1-F6EECF244321}">
-                <p14:modId xmlns:p14="http://schemas.microsoft.com/office/powerpoint/2010/main" val="190846913"/>
+                <p14:modId xmlns:p14="http://schemas.microsoft.com/office/powerpoint/2010/main" val="970500304"/>
               </p:ext>
             </p:extLst>
           </p:nvPr>
@@ -13137,8 +13437,20 @@
                 <a:tableStyleId>{5C22544A-7EE6-4342-B048-85BDC9FD1C3A}</a:tableStyleId>
               </a:tblPr>
               <a:tblGrid>
-                <a:gridCol w="2103519"/>
-                <a:gridCol w="9252055"/>
+                <a:gridCol w="2103519">
+                  <a:extLst>
+                    <a:ext uri="{9D8B030D-6E8A-4147-A177-3AD203B41FA5}">
+                      <a16:colId xmlns:a16="http://schemas.microsoft.com/office/drawing/2014/main" val="20000"/>
+                    </a:ext>
+                  </a:extLst>
+                </a:gridCol>
+                <a:gridCol w="9252055">
+                  <a:extLst>
+                    <a:ext uri="{9D8B030D-6E8A-4147-A177-3AD203B41FA5}">
+                      <a16:colId xmlns:a16="http://schemas.microsoft.com/office/drawing/2014/main" val="20001"/>
+                    </a:ext>
+                  </a:extLst>
+                </a:gridCol>
               </a:tblGrid>
               <a:tr h="230245">
                 <a:tc>
@@ -13148,7 +13460,7 @@
                     <a:p>
                       <a:pPr algn="ctr" fontAlgn="b"/>
                       <a:r>
-                        <a:rPr lang="en-US" sz="1400" b="1" i="0" u="none" strike="noStrike" dirty="0" smtClean="0">
+                        <a:rPr lang="en-US" sz="1400" b="1" i="0" u="none" strike="noStrike" dirty="0">
                           <a:solidFill>
                             <a:srgbClr val="000000"/>
                           </a:solidFill>
@@ -13159,7 +13471,7 @@
                         <a:t>Column</a:t>
                       </a:r>
                       <a:r>
-                        <a:rPr lang="en-US" sz="1400" b="1" i="0" u="none" strike="noStrike" baseline="0" dirty="0" smtClean="0">
+                        <a:rPr lang="en-US" sz="1400" b="1" i="0" u="none" strike="noStrike" baseline="0" dirty="0">
                           <a:solidFill>
                             <a:srgbClr val="000000"/>
                           </a:solidFill>
@@ -13230,7 +13542,7 @@
                     <a:p>
                       <a:pPr algn="ctr" fontAlgn="b"/>
                       <a:r>
-                        <a:rPr lang="en-US" sz="1400" b="1" i="0" u="none" strike="noStrike" dirty="0" smtClean="0">
+                        <a:rPr lang="en-US" sz="1400" b="1" i="0" u="none" strike="noStrike" dirty="0">
                           <a:solidFill>
                             <a:srgbClr val="000000"/>
                           </a:solidFill>
@@ -13240,14 +13552,6 @@
                         </a:rPr>
                         <a:t> Explanation</a:t>
                       </a:r>
-                      <a:endParaRPr lang="en-US" sz="1400" b="1" i="0" u="none" strike="noStrike" dirty="0">
-                        <a:solidFill>
-                          <a:srgbClr val="000000"/>
-                        </a:solidFill>
-                        <a:effectLst/>
-                        <a:latin typeface="Times New Roman" panose="02020603050405020304" pitchFamily="18" charset="0"/>
-                        <a:cs typeface="Times New Roman" panose="02020603050405020304" pitchFamily="18" charset="0"/>
-                      </a:endParaRPr>
                     </a:p>
                   </a:txBody>
                   <a:tcPr marL="513" marR="513" marT="513" marB="0" anchor="ctr">
@@ -13294,6 +13598,11 @@
                     </a:solidFill>
                   </a:tcPr>
                 </a:tc>
+                <a:extLst>
+                  <a:ext uri="{0D108BD9-81ED-4DB2-BD59-A6C34878D82A}">
+                    <a16:rowId xmlns:a16="http://schemas.microsoft.com/office/drawing/2014/main" val="10000"/>
+                  </a:ext>
+                </a:extLst>
               </a:tr>
               <a:tr h="219990">
                 <a:tc>
@@ -13303,7 +13612,7 @@
                     <a:p>
                       <a:pPr algn="l" fontAlgn="b"/>
                       <a:r>
-                        <a:rPr lang="en-US" sz="1100" b="0" i="0" u="none" strike="noStrike" dirty="0" err="1" smtClean="0">
+                        <a:rPr lang="en-US" sz="1100" b="0" i="0" u="none" strike="noStrike" dirty="0" err="1">
                           <a:solidFill>
                             <a:srgbClr val="000000"/>
                           </a:solidFill>
@@ -13370,7 +13679,7 @@
                     <a:p>
                       <a:pPr algn="l" fontAlgn="b"/>
                       <a:r>
-                        <a:rPr lang="en-US" sz="1100" b="0" i="0" u="none" strike="noStrike" dirty="0" smtClean="0">
+                        <a:rPr lang="en-US" sz="1100" b="0" i="0" u="none" strike="noStrike" dirty="0">
                           <a:solidFill>
                             <a:srgbClr val="000000"/>
                           </a:solidFill>
@@ -13381,7 +13690,7 @@
                         <a:t>Converted tot date time. Correcting dates</a:t>
                       </a:r>
                       <a:r>
-                        <a:rPr lang="en-US" sz="1100" b="0" i="0" u="none" strike="noStrike" baseline="0" dirty="0" smtClean="0">
+                        <a:rPr lang="en-US" sz="1100" b="0" i="0" u="none" strike="noStrike" baseline="0" dirty="0">
                           <a:solidFill>
                             <a:srgbClr val="000000"/>
                           </a:solidFill>
@@ -13441,6 +13750,11 @@
                     <a:noFill/>
                   </a:tcPr>
                 </a:tc>
+                <a:extLst>
+                  <a:ext uri="{0D108BD9-81ED-4DB2-BD59-A6C34878D82A}">
+                    <a16:rowId xmlns:a16="http://schemas.microsoft.com/office/drawing/2014/main" val="10001"/>
+                  </a:ext>
+                </a:extLst>
               </a:tr>
               <a:tr h="330458">
                 <a:tc>
@@ -13450,7 +13764,7 @@
                     <a:p>
                       <a:pPr algn="l" fontAlgn="b"/>
                       <a:r>
-                        <a:rPr lang="en-US" sz="1100" b="0" i="0" u="none" strike="noStrike" dirty="0" err="1" smtClean="0">
+                        <a:rPr lang="en-US" sz="1100" b="0" i="0" u="none" strike="noStrike" dirty="0" err="1">
                           <a:solidFill>
                             <a:srgbClr val="000000"/>
                           </a:solidFill>
@@ -13517,7 +13831,7 @@
                     <a:p>
                       <a:pPr algn="l" fontAlgn="b"/>
                       <a:r>
-                        <a:rPr lang="en-US" sz="1100" b="0" i="0" u="none" strike="noStrike" smtClean="0">
+                        <a:rPr lang="en-US" sz="1100" b="0" i="0" u="none" strike="noStrike">
                           <a:solidFill>
                             <a:srgbClr val="000000"/>
                           </a:solidFill>
@@ -13577,6 +13891,11 @@
                     <a:noFill/>
                   </a:tcPr>
                 </a:tc>
+                <a:extLst>
+                  <a:ext uri="{0D108BD9-81ED-4DB2-BD59-A6C34878D82A}">
+                    <a16:rowId xmlns:a16="http://schemas.microsoft.com/office/drawing/2014/main" val="10002"/>
+                  </a:ext>
+                </a:extLst>
               </a:tr>
               <a:tr h="330458">
                 <a:tc>
@@ -13586,7 +13905,7 @@
                     <a:p>
                       <a:pPr algn="l" fontAlgn="b"/>
                       <a:r>
-                        <a:rPr lang="en-US" sz="1100" b="0" i="0" u="none" strike="noStrike" dirty="0" err="1" smtClean="0">
+                        <a:rPr lang="en-US" sz="1100" b="0" i="0" u="none" strike="noStrike" dirty="0" err="1">
                           <a:solidFill>
                             <a:srgbClr val="000000"/>
                           </a:solidFill>
@@ -13653,7 +13972,7 @@
                     <a:p>
                       <a:pPr algn="l" fontAlgn="b"/>
                       <a:r>
-                        <a:rPr lang="en-US" sz="1100" b="0" i="0" u="none" strike="noStrike" smtClean="0">
+                        <a:rPr lang="en-US" sz="1100" b="0" i="0" u="none" strike="noStrike">
                           <a:solidFill>
                             <a:srgbClr val="000000"/>
                           </a:solidFill>
@@ -13713,6 +14032,11 @@
                     <a:noFill/>
                   </a:tcPr>
                 </a:tc>
+                <a:extLst>
+                  <a:ext uri="{0D108BD9-81ED-4DB2-BD59-A6C34878D82A}">
+                    <a16:rowId xmlns:a16="http://schemas.microsoft.com/office/drawing/2014/main" val="10003"/>
+                  </a:ext>
+                </a:extLst>
               </a:tr>
               <a:tr h="330458">
                 <a:tc>
@@ -13722,7 +14046,7 @@
                     <a:p>
                       <a:pPr algn="l" fontAlgn="b"/>
                       <a:r>
-                        <a:rPr lang="en-US" sz="1100" b="0" i="0" u="none" strike="noStrike" dirty="0" err="1" smtClean="0">
+                        <a:rPr lang="en-US" sz="1100" b="0" i="0" u="none" strike="noStrike" dirty="0" err="1">
                           <a:solidFill>
                             <a:srgbClr val="000000"/>
                           </a:solidFill>
@@ -13789,7 +14113,7 @@
                     <a:p>
                       <a:pPr algn="l" fontAlgn="b"/>
                       <a:r>
-                        <a:rPr lang="en-US" sz="1100" b="0" i="0" u="none" strike="noStrike" smtClean="0">
+                        <a:rPr lang="en-US" sz="1100" b="0" i="0" u="none" strike="noStrike">
                           <a:solidFill>
                             <a:srgbClr val="000000"/>
                           </a:solidFill>
@@ -13849,6 +14173,11 @@
                     <a:noFill/>
                   </a:tcPr>
                 </a:tc>
+                <a:extLst>
+                  <a:ext uri="{0D108BD9-81ED-4DB2-BD59-A6C34878D82A}">
+                    <a16:rowId xmlns:a16="http://schemas.microsoft.com/office/drawing/2014/main" val="10004"/>
+                  </a:ext>
+                </a:extLst>
               </a:tr>
               <a:tr h="330458">
                 <a:tc>
@@ -13858,7 +14187,7 @@
                     <a:p>
                       <a:pPr algn="l" fontAlgn="b"/>
                       <a:r>
-                        <a:rPr lang="en-US" sz="1100" b="0" i="0" u="none" strike="noStrike" dirty="0" err="1" smtClean="0">
+                        <a:rPr lang="en-US" sz="1100" b="0" i="0" u="none" strike="noStrike" dirty="0" err="1">
                           <a:solidFill>
                             <a:srgbClr val="000000"/>
                           </a:solidFill>
@@ -13925,7 +14254,7 @@
                     <a:p>
                       <a:pPr algn="l" fontAlgn="b"/>
                       <a:r>
-                        <a:rPr lang="en-US" sz="1100" b="0" i="0" u="none" strike="noStrike" dirty="0" smtClean="0">
+                        <a:rPr lang="en-US" sz="1100" b="0" i="0" u="none" strike="noStrike" dirty="0">
                           <a:solidFill>
                             <a:srgbClr val="000000"/>
                           </a:solidFill>
@@ -13934,6 +14263,72 @@
                           <a:cs typeface="Times New Roman" panose="02020603050405020304" pitchFamily="18" charset="0"/>
                         </a:rPr>
                         <a:t>Converted tot date time</a:t>
+                      </a:r>
+                    </a:p>
+                  </a:txBody>
+                  <a:tcPr anchor="ctr">
+                    <a:lnL w="12700" cap="flat" cmpd="sng" algn="ctr">
+                      <a:solidFill>
+                        <a:schemeClr val="tx1"/>
+                      </a:solidFill>
+                      <a:prstDash val="solid"/>
+                      <a:round/>
+                      <a:headEnd type="none" w="med" len="med"/>
+                      <a:tailEnd type="none" w="med" len="med"/>
+                    </a:lnL>
+                    <a:lnR w="12700" cap="flat" cmpd="sng" algn="ctr">
+                      <a:solidFill>
+                        <a:schemeClr val="tx1"/>
+                      </a:solidFill>
+                      <a:prstDash val="solid"/>
+                      <a:round/>
+                      <a:headEnd type="none" w="med" len="med"/>
+                      <a:tailEnd type="none" w="med" len="med"/>
+                    </a:lnR>
+                    <a:lnT w="12700" cap="flat" cmpd="sng" algn="ctr">
+                      <a:solidFill>
+                        <a:schemeClr val="tx1"/>
+                      </a:solidFill>
+                      <a:prstDash val="solid"/>
+                      <a:round/>
+                      <a:headEnd type="none" w="med" len="med"/>
+                      <a:tailEnd type="none" w="med" len="med"/>
+                    </a:lnT>
+                    <a:lnB w="12700" cap="flat" cmpd="sng" algn="ctr">
+                      <a:solidFill>
+                        <a:schemeClr val="tx1"/>
+                      </a:solidFill>
+                      <a:prstDash val="solid"/>
+                      <a:round/>
+                      <a:headEnd type="none" w="med" len="med"/>
+                      <a:tailEnd type="none" w="med" len="med"/>
+                    </a:lnB>
+                    <a:noFill/>
+                  </a:tcPr>
+                </a:tc>
+                <a:extLst>
+                  <a:ext uri="{0D108BD9-81ED-4DB2-BD59-A6C34878D82A}">
+                    <a16:rowId xmlns:a16="http://schemas.microsoft.com/office/drawing/2014/main" val="10005"/>
+                  </a:ext>
+                </a:extLst>
+              </a:tr>
+              <a:tr h="330458">
+                <a:tc>
+                  <a:txBody>
+                    <a:bodyPr/>
+                    <a:lstStyle/>
+                    <a:p>
+                      <a:pPr algn="l" fontAlgn="b"/>
+                      <a:r>
+                        <a:rPr lang="en-US" sz="1100" b="0" i="0" u="none" strike="noStrike" dirty="0" err="1">
+                          <a:solidFill>
+                            <a:srgbClr val="000000"/>
+                          </a:solidFill>
+                          <a:effectLst/>
+                          <a:latin typeface="Times New Roman" panose="02020603050405020304" pitchFamily="18" charset="0"/>
+                          <a:cs typeface="Times New Roman" panose="02020603050405020304" pitchFamily="18" charset="0"/>
+                        </a:rPr>
+                        <a:t>int_rate</a:t>
                       </a:r>
                       <a:endParaRPr lang="en-US" sz="1100" b="0" i="0" u="none" strike="noStrike" dirty="0">
                         <a:solidFill>
@@ -13985,8 +14380,6 @@
                     <a:noFill/>
                   </a:tcPr>
                 </a:tc>
-              </a:tr>
-              <a:tr h="330458">
                 <a:tc>
                   <a:txBody>
                     <a:bodyPr/>
@@ -13994,74 +14387,7 @@
                     <a:p>
                       <a:pPr algn="l" fontAlgn="b"/>
                       <a:r>
-                        <a:rPr lang="en-US" sz="1100" b="0" i="0" u="none" strike="noStrike" dirty="0" err="1" smtClean="0">
-                          <a:solidFill>
-                            <a:srgbClr val="000000"/>
-                          </a:solidFill>
-                          <a:effectLst/>
-                          <a:latin typeface="Times New Roman" panose="02020603050405020304" pitchFamily="18" charset="0"/>
-                          <a:cs typeface="Times New Roman" panose="02020603050405020304" pitchFamily="18" charset="0"/>
-                        </a:rPr>
-                        <a:t>dti</a:t>
-                      </a:r>
-                      <a:endParaRPr lang="en-US" sz="1100" b="0" i="0" u="none" strike="noStrike" dirty="0">
-                        <a:solidFill>
-                          <a:srgbClr val="000000"/>
-                        </a:solidFill>
-                        <a:effectLst/>
-                        <a:latin typeface="Times New Roman" panose="02020603050405020304" pitchFamily="18" charset="0"/>
-                        <a:cs typeface="Times New Roman" panose="02020603050405020304" pitchFamily="18" charset="0"/>
-                      </a:endParaRPr>
-                    </a:p>
-                  </a:txBody>
-                  <a:tcPr anchor="ctr">
-                    <a:lnL w="12700" cap="flat" cmpd="sng" algn="ctr">
-                      <a:solidFill>
-                        <a:schemeClr val="tx1"/>
-                      </a:solidFill>
-                      <a:prstDash val="solid"/>
-                      <a:round/>
-                      <a:headEnd type="none" w="med" len="med"/>
-                      <a:tailEnd type="none" w="med" len="med"/>
-                    </a:lnL>
-                    <a:lnR w="12700" cap="flat" cmpd="sng" algn="ctr">
-                      <a:solidFill>
-                        <a:schemeClr val="tx1"/>
-                      </a:solidFill>
-                      <a:prstDash val="solid"/>
-                      <a:round/>
-                      <a:headEnd type="none" w="med" len="med"/>
-                      <a:tailEnd type="none" w="med" len="med"/>
-                    </a:lnR>
-                    <a:lnT w="12700" cap="flat" cmpd="sng" algn="ctr">
-                      <a:solidFill>
-                        <a:schemeClr val="tx1"/>
-                      </a:solidFill>
-                      <a:prstDash val="solid"/>
-                      <a:round/>
-                      <a:headEnd type="none" w="med" len="med"/>
-                      <a:tailEnd type="none" w="med" len="med"/>
-                    </a:lnT>
-                    <a:lnB w="12700" cap="flat" cmpd="sng" algn="ctr">
-                      <a:solidFill>
-                        <a:schemeClr val="tx1"/>
-                      </a:solidFill>
-                      <a:prstDash val="solid"/>
-                      <a:round/>
-                      <a:headEnd type="none" w="med" len="med"/>
-                      <a:tailEnd type="none" w="med" len="med"/>
-                    </a:lnB>
-                    <a:noFill/>
-                  </a:tcPr>
-                </a:tc>
-                <a:tc>
-                  <a:txBody>
-                    <a:bodyPr/>
-                    <a:lstStyle/>
-                    <a:p>
-                      <a:pPr algn="l" fontAlgn="b"/>
-                      <a:r>
-                        <a:rPr lang="en-US" sz="1100" b="0" i="0" u="none" strike="noStrike" dirty="0" smtClean="0">
+                        <a:rPr lang="en-US" sz="1100" b="0" i="0" u="none" strike="noStrike" dirty="0">
                           <a:solidFill>
                             <a:srgbClr val="000000"/>
                           </a:solidFill>
@@ -14072,7 +14398,7 @@
                         <a:t>Stripped</a:t>
                       </a:r>
                       <a:r>
-                        <a:rPr lang="en-US" sz="1100" b="0" i="0" u="none" strike="noStrike" baseline="0" dirty="0" smtClean="0">
+                        <a:rPr lang="en-US" sz="1100" b="0" i="0" u="none" strike="noStrike" baseline="0" dirty="0">
                           <a:solidFill>
                             <a:srgbClr val="000000"/>
                           </a:solidFill>
@@ -14132,6 +14458,11 @@
                     <a:noFill/>
                   </a:tcPr>
                 </a:tc>
+                <a:extLst>
+                  <a:ext uri="{0D108BD9-81ED-4DB2-BD59-A6C34878D82A}">
+                    <a16:rowId xmlns:a16="http://schemas.microsoft.com/office/drawing/2014/main" val="10006"/>
+                  </a:ext>
+                </a:extLst>
               </a:tr>
               <a:tr h="330458">
                 <a:tc>
@@ -14141,7 +14472,7 @@
                     <a:p>
                       <a:pPr algn="l" fontAlgn="b"/>
                       <a:r>
-                        <a:rPr lang="en-US" sz="1100" b="0" i="0" u="none" strike="noStrike" dirty="0" err="1" smtClean="0">
+                        <a:rPr lang="en-US" sz="1100" b="0" i="0" u="none" strike="noStrike" dirty="0" err="1">
                           <a:solidFill>
                             <a:srgbClr val="000000"/>
                           </a:solidFill>
@@ -14208,7 +14539,7 @@
                     <a:p>
                       <a:pPr algn="l" fontAlgn="b"/>
                       <a:r>
-                        <a:rPr lang="en-US" sz="1100" b="0" i="0" u="none" strike="noStrike" dirty="0" smtClean="0">
+                        <a:rPr lang="en-US" sz="1100" b="0" i="0" u="none" strike="noStrike" dirty="0">
                           <a:solidFill>
                             <a:srgbClr val="000000"/>
                           </a:solidFill>
@@ -14219,7 +14550,7 @@
                         <a:t>Stripped</a:t>
                       </a:r>
                       <a:r>
-                        <a:rPr lang="en-US" sz="1100" b="0" i="0" u="none" strike="noStrike" baseline="0" dirty="0" smtClean="0">
+                        <a:rPr lang="en-US" sz="1100" b="0" i="0" u="none" strike="noStrike" baseline="0" dirty="0">
                           <a:solidFill>
                             <a:srgbClr val="000000"/>
                           </a:solidFill>
@@ -14279,6 +14610,11 @@
                     <a:noFill/>
                   </a:tcPr>
                 </a:tc>
+                <a:extLst>
+                  <a:ext uri="{0D108BD9-81ED-4DB2-BD59-A6C34878D82A}">
+                    <a16:rowId xmlns:a16="http://schemas.microsoft.com/office/drawing/2014/main" val="10007"/>
+                  </a:ext>
+                </a:extLst>
               </a:tr>
             </a:tbl>
           </a:graphicData>
@@ -14307,16 +14643,8 @@
           <a:lstStyle/>
           <a:p>
             <a:r>
-              <a:rPr lang="en-IN" sz="3600" b="1" dirty="0" smtClean="0"/>
-              <a:t>Data </a:t>
-            </a:r>
-            <a:r>
-              <a:rPr lang="en-IN" sz="3600" b="1" dirty="0" smtClean="0"/>
-              <a:t>cleaning</a:t>
-            </a:r>
-            <a:r>
               <a:rPr lang="en-IN" sz="3600" b="1" dirty="0"/>
-              <a:t>	</a:t>
+              <a:t>Data cleaning	</a:t>
             </a:r>
           </a:p>
         </p:txBody>
@@ -14331,13 +14659,6 @@
   <p:clrMapOvr>
     <a:masterClrMapping/>
   </p:clrMapOvr>
-  <p:timing>
-    <p:tnLst>
-      <p:par>
-        <p:cTn id="1" dur="indefinite" restart="never" nodeType="tmRoot"/>
-      </p:par>
-    </p:tnLst>
-  </p:timing>
 </p:sld>
 </file>
 
@@ -14381,12 +14702,8 @@
           <a:lstStyle/>
           <a:p>
             <a:r>
-              <a:rPr lang="en-IN" sz="3600" b="1" dirty="0" smtClean="0"/>
-              <a:t>Data we derived</a:t>
-            </a:r>
-            <a:r>
               <a:rPr lang="en-IN" sz="3600" b="1" dirty="0"/>
-              <a:t>	</a:t>
+              <a:t>Data we derived	</a:t>
             </a:r>
           </a:p>
         </p:txBody>
@@ -14412,7 +14729,7 @@
         </p:xfrm>
         <a:graphic>
           <a:graphicData uri="http://schemas.openxmlformats.org/drawingml/2006/diagram">
-            <dgm:relIds xmlns:dgm="http://schemas.openxmlformats.org/drawingml/2006/diagram" xmlns:r="http://schemas.openxmlformats.org/officeDocument/2006/relationships" r:dm="rId2" r:lo="rId3" r:qs="rId4" r:cs="rId5"/>
+            <dgm:relIds xmlns:dgm="http://schemas.openxmlformats.org/drawingml/2006/diagram" xmlns:r="http://schemas.openxmlformats.org/officeDocument/2006/relationships" r:dm="rId3" r:lo="rId4" r:qs="rId5" r:cs="rId6"/>
           </a:graphicData>
         </a:graphic>
       </p:graphicFrame>
@@ -14426,13 +14743,6 @@
   <p:clrMapOvr>
     <a:masterClrMapping/>
   </p:clrMapOvr>
-  <p:timing>
-    <p:tnLst>
-      <p:par>
-        <p:cTn id="1" dur="indefinite" restart="never" nodeType="tmRoot"/>
-      </p:par>
-    </p:tnLst>
-  </p:timing>
 </p:sld>
 </file>
 
@@ -14496,17 +14806,16 @@
           <a:p>
             <a:pPr algn="ctr"/>
             <a:r>
-              <a:rPr lang="en-IN" sz="2800" dirty="0" smtClean="0"/>
-              <a:t>Analyses &amp; Hypothesis</a:t>
+              <a:rPr lang="en-IN" sz="2800" dirty="0"/>
+              <a:t>Analyses &amp; Inferences</a:t>
             </a:r>
             <a:br>
-              <a:rPr lang="en-IN" sz="2800" dirty="0" smtClean="0"/>
+              <a:rPr lang="en-IN" sz="2800" dirty="0"/>
             </a:br>
             <a:r>
-              <a:rPr lang="en-IN" sz="2800" dirty="0" smtClean="0"/>
+              <a:rPr lang="en-IN" sz="2800" dirty="0"/>
               <a:t> </a:t>
             </a:r>
-            <a:endParaRPr lang="en-IN" sz="2800" dirty="0"/>
           </a:p>
         </p:txBody>
       </p:sp>
@@ -14520,13 +14829,6 @@
   <p:clrMapOvr>
     <a:masterClrMapping/>
   </p:clrMapOvr>
-  <p:timing>
-    <p:tnLst>
-      <p:par>
-        <p:cTn id="1" dur="indefinite" restart="never" nodeType="tmRoot"/>
-      </p:par>
-    </p:tnLst>
-  </p:timing>
 </p:sld>
 </file>
 
@@ -14549,10 +14851,10 @@
       </p:grpSpPr>
       <p:sp>
         <p:nvSpPr>
-          <p:cNvPr id="6" name="Title 1">
+          <p:cNvPr id="2" name="Title 1">
             <a:extLst>
               <a:ext uri="{FF2B5EF4-FFF2-40B4-BE49-F238E27FC236}">
-                <a16:creationId xmlns="" xmlns:a16="http://schemas.microsoft.com/office/drawing/2014/main" id="{C9ED24FB-F1DF-43A2-A28A-E1B9714DF31A}"/>
+                <a16:creationId xmlns:a16="http://schemas.microsoft.com/office/drawing/2014/main" id="{703D027D-982D-473A-9128-2B36AFB31D45}"/>
               </a:ext>
             </a:extLst>
           </p:cNvPr>
@@ -14563,205 +14865,53 @@
             <p:ph type="title"/>
           </p:nvPr>
         </p:nvSpPr>
-        <p:spPr>
-          <a:xfrm>
-            <a:off x="404949" y="800336"/>
-            <a:ext cx="11168742" cy="856138"/>
-          </a:xfrm>
-        </p:spPr>
+        <p:spPr/>
         <p:txBody>
-          <a:bodyPr>
-            <a:normAutofit/>
-          </a:bodyPr>
+          <a:bodyPr/>
           <a:lstStyle/>
           <a:p>
             <a:r>
-              <a:rPr lang="en-IN" sz="3600" b="1" dirty="0" smtClean="0"/>
-              <a:t>Rate of interest impact</a:t>
+              <a:rPr lang="en-US" dirty="0"/>
+              <a:t>Analysis of various columns</a:t>
             </a:r>
-            <a:endParaRPr lang="en-IN" sz="3600" b="1" dirty="0"/>
           </a:p>
         </p:txBody>
       </p:sp>
       <p:sp>
         <p:nvSpPr>
-          <p:cNvPr id="9" name="TextBox 8"/>
-          <p:cNvSpPr txBox="1"/>
-          <p:nvPr/>
+          <p:cNvPr id="3" name="Content Placeholder 2">
+            <a:extLst>
+              <a:ext uri="{FF2B5EF4-FFF2-40B4-BE49-F238E27FC236}">
+                <a16:creationId xmlns:a16="http://schemas.microsoft.com/office/drawing/2014/main" id="{AF2107F1-B9AA-400F-9F0E-8FF275D3B65E}"/>
+              </a:ext>
+            </a:extLst>
+          </p:cNvPr>
+          <p:cNvSpPr>
+            <a:spLocks noGrp="1"/>
+          </p:cNvSpPr>
+          <p:nvPr>
+            <p:ph idx="1"/>
+          </p:nvPr>
         </p:nvSpPr>
-        <p:spPr>
-          <a:xfrm>
-            <a:off x="8091377" y="1562986"/>
-            <a:ext cx="3949995" cy="3647152"/>
-          </a:xfrm>
-          <a:prstGeom prst="rect">
-            <a:avLst/>
-          </a:prstGeom>
-          <a:noFill/>
-        </p:spPr>
+        <p:spPr/>
         <p:txBody>
-          <a:bodyPr wrap="square" rtlCol="0">
-            <a:spAutoFit/>
-          </a:bodyPr>
+          <a:bodyPr/>
           <a:lstStyle/>
           <a:p>
-            <a:pPr>
-              <a:lnSpc>
-                <a:spcPct val="150000"/>
-              </a:lnSpc>
-            </a:pPr>
-            <a:r>
-              <a:rPr lang="en-US" sz="1400" b="1" u="sng" dirty="0" smtClean="0"/>
-              <a:t>Observations:</a:t>
-            </a:r>
-            <a:r>
-              <a:rPr lang="en-US" sz="1400" dirty="0" smtClean="0"/>
-              <a:t> </a:t>
-            </a:r>
-          </a:p>
-          <a:p>
-            <a:pPr marL="285750" indent="-285750">
-              <a:lnSpc>
-                <a:spcPct val="150000"/>
-              </a:lnSpc>
-              <a:buFont typeface="Wingdings" panose="05000000000000000000" pitchFamily="2" charset="2"/>
-              <a:buChar char="Ø"/>
-            </a:pPr>
-            <a:r>
-              <a:rPr lang="en-US" sz="1400" dirty="0" smtClean="0"/>
-              <a:t>Rate of interes</a:t>
-            </a:r>
-            <a:r>
-              <a:rPr lang="en-US" sz="1400" dirty="0" smtClean="0"/>
-              <a:t>t for fully paid is consistently lower </a:t>
-            </a:r>
-            <a:r>
-              <a:rPr lang="en-US" sz="1400" dirty="0" err="1" smtClean="0"/>
-              <a:t>vompared</a:t>
-            </a:r>
-            <a:r>
-              <a:rPr lang="en-US" sz="1400" dirty="0" smtClean="0"/>
-              <a:t> to charged off/default over the years</a:t>
-            </a:r>
-          </a:p>
-          <a:p>
-            <a:pPr marL="285750" indent="-285750">
-              <a:lnSpc>
-                <a:spcPct val="150000"/>
-              </a:lnSpc>
-              <a:buFont typeface="Wingdings" panose="05000000000000000000" pitchFamily="2" charset="2"/>
-              <a:buChar char="Ø"/>
-            </a:pPr>
-            <a:r>
-              <a:rPr lang="en-US" sz="1400" dirty="0" smtClean="0"/>
-              <a:t>Post 2010 the gap is significantly higher</a:t>
-            </a:r>
-            <a:endParaRPr lang="en-US" sz="1400" dirty="0" smtClean="0"/>
-          </a:p>
-          <a:p>
-            <a:pPr>
-              <a:lnSpc>
-                <a:spcPct val="150000"/>
-              </a:lnSpc>
-            </a:pPr>
-            <a:r>
-              <a:rPr lang="en-US" sz="1400" b="1" u="sng" dirty="0" smtClean="0"/>
-              <a:t>Inferences:</a:t>
-            </a:r>
-            <a:r>
-              <a:rPr lang="en-US" sz="1400" dirty="0" smtClean="0"/>
-              <a:t> </a:t>
-            </a:r>
-          </a:p>
-          <a:p>
-            <a:pPr marL="285750" indent="-285750">
-              <a:lnSpc>
-                <a:spcPct val="150000"/>
-              </a:lnSpc>
-              <a:buFont typeface="Wingdings" panose="05000000000000000000" pitchFamily="2" charset="2"/>
-              <a:buChar char="Ø"/>
-            </a:pPr>
-            <a:r>
-              <a:rPr lang="en-US" sz="1400" dirty="0" smtClean="0"/>
-              <a:t>Higher rate of interest are guided by high risky loans</a:t>
-            </a:r>
-          </a:p>
-          <a:p>
-            <a:pPr marL="285750" indent="-285750">
-              <a:lnSpc>
-                <a:spcPct val="150000"/>
-              </a:lnSpc>
-              <a:buFont typeface="Wingdings" panose="05000000000000000000" pitchFamily="2" charset="2"/>
-              <a:buChar char="Ø"/>
-            </a:pPr>
-            <a:r>
-              <a:rPr lang="en-US" sz="1400" dirty="0" smtClean="0"/>
-              <a:t>People with lower grades tend to get higher rate of interest</a:t>
-            </a:r>
-          </a:p>
-          <a:p>
-            <a:pPr marL="285750" indent="-285750">
-              <a:lnSpc>
-                <a:spcPct val="150000"/>
-              </a:lnSpc>
-              <a:buFont typeface="Wingdings" panose="05000000000000000000" pitchFamily="2" charset="2"/>
-              <a:buChar char="Ø"/>
-            </a:pPr>
-            <a:r>
-              <a:rPr lang="en-US" sz="1400" dirty="0" smtClean="0"/>
-              <a:t>This risk factor leads to charged off</a:t>
-            </a:r>
-            <a:endParaRPr lang="en-US" sz="1400" dirty="0"/>
+            <a:endParaRPr lang="en-US"/>
           </a:p>
         </p:txBody>
       </p:sp>
-      <p:pic>
-        <p:nvPicPr>
-          <p:cNvPr id="4" name="Picture 3"/>
-          <p:cNvPicPr>
-            <a:picLocks noChangeAspect="1"/>
-          </p:cNvPicPr>
-          <p:nvPr/>
-        </p:nvPicPr>
-        <p:blipFill>
-          <a:blip r:embed="rId2">
-            <a:extLst>
-              <a:ext uri="{28A0092B-C50C-407E-A947-70E740481C1C}">
-                <a14:useLocalDpi xmlns:a14="http://schemas.microsoft.com/office/drawing/2010/main" val="0"/>
-              </a:ext>
-            </a:extLst>
-          </a:blip>
-          <a:stretch>
-            <a:fillRect/>
-          </a:stretch>
-        </p:blipFill>
-        <p:spPr>
-          <a:xfrm>
-            <a:off x="0" y="1461976"/>
-            <a:ext cx="7403384" cy="5544879"/>
-          </a:xfrm>
-          <a:prstGeom prst="rect">
-            <a:avLst/>
-          </a:prstGeom>
-        </p:spPr>
-      </p:pic>
     </p:spTree>
     <p:extLst>
       <p:ext uri="{BB962C8B-B14F-4D97-AF65-F5344CB8AC3E}">
-        <p14:creationId xmlns:p14="http://schemas.microsoft.com/office/powerpoint/2010/main" val="3608566508"/>
+        <p14:creationId xmlns:p14="http://schemas.microsoft.com/office/powerpoint/2010/main" val="3459183276"/>
       </p:ext>
     </p:extLst>
   </p:cSld>
   <p:clrMapOvr>
     <a:masterClrMapping/>
   </p:clrMapOvr>
-  <p:timing>
-    <p:tnLst>
-      <p:par>
-        <p:cTn id="1" dur="indefinite" restart="never" nodeType="tmRoot"/>
-      </p:par>
-    </p:tnLst>
-  </p:timing>
 </p:sld>
 </file>
 
@@ -14787,7 +14937,7 @@
           <p:cNvPr id="6" name="Title 1">
             <a:extLst>
               <a:ext uri="{FF2B5EF4-FFF2-40B4-BE49-F238E27FC236}">
-                <a16:creationId xmlns="" xmlns:a16="http://schemas.microsoft.com/office/drawing/2014/main" id="{C9ED24FB-F1DF-43A2-A28A-E1B9714DF31A}"/>
+                <a16:creationId xmlns:a16="http://schemas.microsoft.com/office/drawing/2014/main" id="{C9ED24FB-F1DF-43A2-A28A-E1B9714DF31A}"/>
               </a:ext>
             </a:extLst>
           </p:cNvPr>
@@ -14811,10 +14961,9 @@
           <a:lstStyle/>
           <a:p>
             <a:r>
-              <a:rPr lang="en-IN" sz="3600" b="1" dirty="0" smtClean="0"/>
-              <a:t>Home ownership impact</a:t>
+              <a:rPr lang="en-IN" sz="3600" b="1" dirty="0"/>
+              <a:t>Rate of interest impact</a:t>
             </a:r>
-            <a:endParaRPr lang="en-IN" sz="3600" b="1" dirty="0"/>
           </a:p>
         </p:txBody>
       </p:sp>
@@ -14827,7 +14976,7 @@
         <p:spPr>
           <a:xfrm>
             <a:off x="8091377" y="1562986"/>
-            <a:ext cx="3949995" cy="4939814"/>
+            <a:ext cx="3949995" cy="3647152"/>
           </a:xfrm>
           <a:prstGeom prst="rect">
             <a:avLst/>
@@ -14846,25 +14995,12 @@
               </a:lnSpc>
             </a:pPr>
             <a:r>
-              <a:rPr lang="en-US" sz="1400" b="1" u="sng" dirty="0" smtClean="0"/>
+              <a:rPr lang="en-US" sz="1400" b="1" u="sng" dirty="0"/>
               <a:t>Observations:</a:t>
             </a:r>
             <a:r>
-              <a:rPr lang="en-US" sz="1400" dirty="0" smtClean="0"/>
+              <a:rPr lang="en-US" sz="1400" dirty="0"/>
               <a:t> </a:t>
-            </a:r>
-          </a:p>
-          <a:p>
-            <a:pPr marL="285750" indent="-285750">
-              <a:lnSpc>
-                <a:spcPct val="150000"/>
-              </a:lnSpc>
-              <a:buFont typeface="Wingdings" panose="05000000000000000000" pitchFamily="2" charset="2"/>
-              <a:buChar char="Ø"/>
-            </a:pPr>
-            <a:r>
-              <a:rPr lang="en-US" sz="1400" dirty="0" smtClean="0"/>
-              <a:t>Mortgage and rent have the highest loans given</a:t>
             </a:r>
           </a:p>
           <a:p>
@@ -14877,29 +15013,16 @@
             </a:pPr>
             <a:r>
               <a:rPr lang="en-US" sz="1400" dirty="0"/>
-              <a:t>Between </a:t>
+              <a:t>Rate of interest for fully paid is consistently lower </a:t>
             </a:r>
             <a:r>
-              <a:rPr lang="en-US" sz="1400" dirty="0" smtClean="0"/>
-              <a:t>mortgage, rent and own, </a:t>
+              <a:rPr lang="en-US" sz="1400" dirty="0" err="1"/>
+              <a:t>vompared</a:t>
             </a:r>
             <a:r>
               <a:rPr lang="en-US" sz="1400" dirty="0"/>
-              <a:t>rented </a:t>
+              <a:t> to charged off/default over the years</a:t>
             </a:r>
-            <a:r>
-              <a:rPr lang="en-US" sz="1400" dirty="0" smtClean="0"/>
-              <a:t>and own home owners tend </a:t>
-            </a:r>
-            <a:r>
-              <a:rPr lang="en-US" sz="1400" dirty="0"/>
-              <a:t>to default </a:t>
-            </a:r>
-            <a:r>
-              <a:rPr lang="en-US" sz="1400" dirty="0" smtClean="0"/>
-              <a:t>more compared to Mortgage</a:t>
-            </a:r>
-            <a:endParaRPr lang="en-US" sz="1400" dirty="0"/>
           </a:p>
           <a:p>
             <a:pPr marL="285750" indent="-285750">
@@ -14910,8 +15033,8 @@
               <a:buChar char="Ø"/>
             </a:pPr>
             <a:r>
-              <a:rPr lang="en-US" sz="1400" dirty="0" smtClean="0"/>
-              <a:t>Although not many loans under others, it has a significant percentage of loan defaulting (&gt;20%)</a:t>
+              <a:rPr lang="en-US" sz="1400" dirty="0"/>
+              <a:t>Post 2010 the gap is significantly higher</a:t>
             </a:r>
           </a:p>
           <a:p>
@@ -14921,15 +15044,11 @@
               </a:lnSpc>
             </a:pPr>
             <a:r>
-              <a:rPr lang="en-US" sz="1400" b="1" u="sng" dirty="0" smtClean="0"/>
-              <a:t>Inferences</a:t>
+              <a:rPr lang="en-US" sz="1400" b="1" u="sng" dirty="0"/>
+              <a:t>Inferences:</a:t>
             </a:r>
             <a:r>
-              <a:rPr lang="en-US" sz="1400" b="1" u="sng" dirty="0" smtClean="0"/>
-              <a:t>:</a:t>
-            </a:r>
-            <a:r>
-              <a:rPr lang="en-US" sz="1400" dirty="0" smtClean="0"/>
+              <a:rPr lang="en-US" sz="1400" dirty="0"/>
               <a:t> </a:t>
             </a:r>
           </a:p>
@@ -14942,8 +15061,8 @@
               <a:buChar char="Ø"/>
             </a:pPr>
             <a:r>
-              <a:rPr lang="en-US" sz="1400" dirty="0" smtClean="0"/>
-              <a:t>Others is an undefined category, need more data to understand why it has more defaults</a:t>
+              <a:rPr lang="en-US" sz="1400" dirty="0"/>
+              <a:t>Higher rate of interest are guided by high risky loans</a:t>
             </a:r>
           </a:p>
           <a:p>
@@ -14955,36 +15074,28 @@
               <a:buChar char="Ø"/>
             </a:pPr>
             <a:r>
-              <a:rPr lang="en-US" sz="1400" dirty="0" smtClean="0"/>
-              <a:t>Mortgage has lower percentage of default. Since mortgage is a major loan and any default on other loan will increase the </a:t>
+              <a:rPr lang="en-US" sz="1400" dirty="0"/>
+              <a:t>People with lower grades tend to get higher rate of interest</a:t>
             </a:r>
+          </a:p>
+          <a:p>
+            <a:pPr marL="285750" indent="-285750">
+              <a:lnSpc>
+                <a:spcPct val="150000"/>
+              </a:lnSpc>
+              <a:buFont typeface="Wingdings" panose="05000000000000000000" pitchFamily="2" charset="2"/>
+              <a:buChar char="Ø"/>
+            </a:pPr>
             <a:r>
-              <a:rPr lang="en-US" sz="1400" dirty="0" err="1" smtClean="0"/>
-              <a:t>RoI</a:t>
+              <a:rPr lang="en-US" sz="1400" dirty="0"/>
+              <a:t>This risk factor leads to charged off</a:t>
             </a:r>
-            <a:r>
-              <a:rPr lang="en-US" sz="1400" dirty="0" smtClean="0"/>
-              <a:t> or loan </a:t>
-            </a:r>
-            <a:r>
-              <a:rPr lang="en-US" sz="1400" dirty="0" err="1" smtClean="0"/>
-              <a:t>categrory</a:t>
-            </a:r>
-            <a:r>
-              <a:rPr lang="en-US" sz="1400" dirty="0" smtClean="0"/>
-              <a:t>, hence Mortgage owners tends to pay back and have a less risk of </a:t>
-            </a:r>
-            <a:r>
-              <a:rPr lang="en-US" sz="1400" dirty="0" err="1" smtClean="0"/>
-              <a:t>efaulting</a:t>
-            </a:r>
-            <a:endParaRPr lang="en-US" sz="1400" dirty="0"/>
           </a:p>
         </p:txBody>
       </p:sp>
       <p:pic>
         <p:nvPicPr>
-          <p:cNvPr id="5" name="Picture 4"/>
+          <p:cNvPr id="4" name="Picture 3"/>
           <p:cNvPicPr>
             <a:picLocks noChangeAspect="1"/>
           </p:cNvPicPr>
@@ -15004,8 +15115,8 @@
         </p:blipFill>
         <p:spPr>
           <a:xfrm>
-            <a:off x="318446" y="1656474"/>
-            <a:ext cx="7028652" cy="4414717"/>
+            <a:off x="150628" y="1483830"/>
+            <a:ext cx="7175458" cy="5374170"/>
           </a:xfrm>
           <a:prstGeom prst="rect">
             <a:avLst/>
@@ -15015,20 +15126,13 @@
     </p:spTree>
     <p:extLst>
       <p:ext uri="{BB962C8B-B14F-4D97-AF65-F5344CB8AC3E}">
-        <p14:creationId xmlns:p14="http://schemas.microsoft.com/office/powerpoint/2010/main" val="3095347154"/>
+        <p14:creationId xmlns:p14="http://schemas.microsoft.com/office/powerpoint/2010/main" val="3608566508"/>
       </p:ext>
     </p:extLst>
   </p:cSld>
   <p:clrMapOvr>
     <a:masterClrMapping/>
   </p:clrMapOvr>
-  <p:timing>
-    <p:tnLst>
-      <p:par>
-        <p:cTn id="1" dur="indefinite" restart="never" nodeType="tmRoot"/>
-      </p:par>
-    </p:tnLst>
-  </p:timing>
 </p:sld>
 </file>
 

</xml_diff>